<commit_message>
Receving emails now possible, adapted the presentation
</commit_message>
<xml_diff>
--- a/docs/IR1.pptx
+++ b/docs/IR1.pptx
@@ -111,6 +111,11 @@
       </a:defRPr>
     </a:lvl9pPr>
   </p:defaultTextStyle>
+  <p:extLst>
+    <p:ext uri="{EFAFB233-063F-42B5-8137-9DF3F51BA10A}">
+      <p15:sldGuideLst xmlns:p15="http://schemas.microsoft.com/office/powerpoint/2012/main"/>
+    </p:ext>
+  </p:extLst>
 </p:presentation>
 </file>
 
@@ -7888,14 +7893,302 @@
       </p:graphicFrame>
       <p:pic>
         <p:nvPicPr>
-          <p:cNvPr id="2050" name="Picture 2" descr="http://vitamin-c.vitamin-power.eu/assets/images/Gruener-Haken.jpg"/>
+          <p:cNvPr id="8" name="Grafik 7"/>
+          <p:cNvPicPr>
+            <a:picLocks noChangeAspect="1"/>
+          </p:cNvPicPr>
+          <p:nvPr/>
+        </p:nvPicPr>
+        <p:blipFill>
+          <a:blip r:embed="rId3"/>
+          <a:stretch>
+            <a:fillRect/>
+          </a:stretch>
+        </p:blipFill>
+        <p:spPr>
+          <a:xfrm>
+            <a:off x="8470900" y="1636380"/>
+            <a:ext cx="248400" cy="248400"/>
+          </a:xfrm>
+          <a:prstGeom prst="rect">
+            <a:avLst/>
+          </a:prstGeom>
+        </p:spPr>
+      </p:pic>
+      <p:pic>
+        <p:nvPicPr>
+          <p:cNvPr id="7" name="Grafik 6"/>
+          <p:cNvPicPr>
+            <a:picLocks noChangeAspect="1"/>
+          </p:cNvPicPr>
+          <p:nvPr/>
+        </p:nvPicPr>
+        <p:blipFill>
+          <a:blip r:embed="rId3"/>
+          <a:stretch>
+            <a:fillRect/>
+          </a:stretch>
+        </p:blipFill>
+        <p:spPr>
+          <a:xfrm>
+            <a:off x="8469054" y="2380709"/>
+            <a:ext cx="248400" cy="248400"/>
+          </a:xfrm>
+          <a:prstGeom prst="rect">
+            <a:avLst/>
+          </a:prstGeom>
+        </p:spPr>
+      </p:pic>
+      <p:pic>
+        <p:nvPicPr>
+          <p:cNvPr id="10" name="Grafik 9"/>
+          <p:cNvPicPr>
+            <a:picLocks noChangeAspect="1"/>
+          </p:cNvPicPr>
+          <p:nvPr/>
+        </p:nvPicPr>
+        <p:blipFill>
+          <a:blip r:embed="rId3"/>
+          <a:stretch>
+            <a:fillRect/>
+          </a:stretch>
+        </p:blipFill>
+        <p:spPr>
+          <a:xfrm>
+            <a:off x="8469054" y="3141701"/>
+            <a:ext cx="248400" cy="248400"/>
+          </a:xfrm>
+          <a:prstGeom prst="rect">
+            <a:avLst/>
+          </a:prstGeom>
+        </p:spPr>
+      </p:pic>
+      <p:pic>
+        <p:nvPicPr>
+          <p:cNvPr id="11" name="Grafik 10"/>
+          <p:cNvPicPr>
+            <a:picLocks noChangeAspect="1"/>
+          </p:cNvPicPr>
+          <p:nvPr/>
+        </p:nvPicPr>
+        <p:blipFill>
+          <a:blip r:embed="rId3"/>
+          <a:stretch>
+            <a:fillRect/>
+          </a:stretch>
+        </p:blipFill>
+        <p:spPr>
+          <a:xfrm>
+            <a:off x="8469054" y="3495947"/>
+            <a:ext cx="248400" cy="248400"/>
+          </a:xfrm>
+          <a:prstGeom prst="rect">
+            <a:avLst/>
+          </a:prstGeom>
+        </p:spPr>
+      </p:pic>
+      <p:pic>
+        <p:nvPicPr>
+          <p:cNvPr id="12" name="Grafik 11"/>
+          <p:cNvPicPr>
+            <a:picLocks noChangeAspect="1"/>
+          </p:cNvPicPr>
+          <p:nvPr/>
+        </p:nvPicPr>
+        <p:blipFill>
+          <a:blip r:embed="rId3"/>
+          <a:stretch>
+            <a:fillRect/>
+          </a:stretch>
+        </p:blipFill>
+        <p:spPr>
+          <a:xfrm>
+            <a:off x="8467208" y="3866552"/>
+            <a:ext cx="248400" cy="248400"/>
+          </a:xfrm>
+          <a:prstGeom prst="rect">
+            <a:avLst/>
+          </a:prstGeom>
+        </p:spPr>
+      </p:pic>
+      <p:pic>
+        <p:nvPicPr>
+          <p:cNvPr id="13" name="Grafik 12"/>
+          <p:cNvPicPr>
+            <a:picLocks noChangeAspect="1"/>
+          </p:cNvPicPr>
+          <p:nvPr/>
+        </p:nvPicPr>
+        <p:blipFill>
+          <a:blip r:embed="rId3"/>
+          <a:stretch>
+            <a:fillRect/>
+          </a:stretch>
+        </p:blipFill>
+        <p:spPr>
+          <a:xfrm>
+            <a:off x="8467208" y="4239899"/>
+            <a:ext cx="248400" cy="248400"/>
+          </a:xfrm>
+          <a:prstGeom prst="rect">
+            <a:avLst/>
+          </a:prstGeom>
+        </p:spPr>
+      </p:pic>
+      <p:pic>
+        <p:nvPicPr>
+          <p:cNvPr id="14" name="Grafik 13"/>
+          <p:cNvPicPr>
+            <a:picLocks noChangeAspect="1"/>
+          </p:cNvPicPr>
+          <p:nvPr/>
+        </p:nvPicPr>
+        <p:blipFill>
+          <a:blip r:embed="rId3"/>
+          <a:stretch>
+            <a:fillRect/>
+          </a:stretch>
+        </p:blipFill>
+        <p:spPr>
+          <a:xfrm>
+            <a:off x="8467208" y="4627544"/>
+            <a:ext cx="248400" cy="248400"/>
+          </a:xfrm>
+          <a:prstGeom prst="rect">
+            <a:avLst/>
+          </a:prstGeom>
+        </p:spPr>
+      </p:pic>
+      <p:pic>
+        <p:nvPicPr>
+          <p:cNvPr id="15" name="Grafik 14"/>
+          <p:cNvPicPr>
+            <a:picLocks noChangeAspect="1"/>
+          </p:cNvPicPr>
+          <p:nvPr/>
+        </p:nvPicPr>
+        <p:blipFill>
+          <a:blip r:embed="rId3"/>
+          <a:stretch>
+            <a:fillRect/>
+          </a:stretch>
+        </p:blipFill>
+        <p:spPr>
+          <a:xfrm>
+            <a:off x="8467208" y="4972098"/>
+            <a:ext cx="248400" cy="248400"/>
+          </a:xfrm>
+          <a:prstGeom prst="rect">
+            <a:avLst/>
+          </a:prstGeom>
+        </p:spPr>
+      </p:pic>
+      <p:pic>
+        <p:nvPicPr>
+          <p:cNvPr id="16" name="Grafik 15"/>
+          <p:cNvPicPr>
+            <a:picLocks noChangeAspect="1"/>
+          </p:cNvPicPr>
+          <p:nvPr/>
+        </p:nvPicPr>
+        <p:blipFill>
+          <a:blip r:embed="rId3"/>
+          <a:stretch>
+            <a:fillRect/>
+          </a:stretch>
+        </p:blipFill>
+        <p:spPr>
+          <a:xfrm>
+            <a:off x="8467208" y="5352395"/>
+            <a:ext cx="248400" cy="248400"/>
+          </a:xfrm>
+          <a:prstGeom prst="rect">
+            <a:avLst/>
+          </a:prstGeom>
+        </p:spPr>
+      </p:pic>
+      <p:pic>
+        <p:nvPicPr>
+          <p:cNvPr id="17" name="Grafik 16"/>
+          <p:cNvPicPr>
+            <a:picLocks noChangeAspect="1"/>
+          </p:cNvPicPr>
+          <p:nvPr/>
+        </p:nvPicPr>
+        <p:blipFill>
+          <a:blip r:embed="rId3"/>
+          <a:stretch>
+            <a:fillRect/>
+          </a:stretch>
+        </p:blipFill>
+        <p:spPr>
+          <a:xfrm>
+            <a:off x="8467208" y="5722182"/>
+            <a:ext cx="248400" cy="248400"/>
+          </a:xfrm>
+          <a:prstGeom prst="rect">
+            <a:avLst/>
+          </a:prstGeom>
+        </p:spPr>
+      </p:pic>
+      <p:pic>
+        <p:nvPicPr>
+          <p:cNvPr id="18" name="Grafik 17"/>
+          <p:cNvPicPr>
+            <a:picLocks noChangeAspect="1"/>
+          </p:cNvPicPr>
+          <p:nvPr/>
+        </p:nvPicPr>
+        <p:blipFill>
+          <a:blip r:embed="rId3"/>
+          <a:stretch>
+            <a:fillRect/>
+          </a:stretch>
+        </p:blipFill>
+        <p:spPr>
+          <a:xfrm>
+            <a:off x="8467208" y="1252887"/>
+            <a:ext cx="248400" cy="248400"/>
+          </a:xfrm>
+          <a:prstGeom prst="rect">
+            <a:avLst/>
+          </a:prstGeom>
+        </p:spPr>
+      </p:pic>
+      <p:pic>
+        <p:nvPicPr>
+          <p:cNvPr id="19" name="Grafik 18"/>
+          <p:cNvPicPr>
+            <a:picLocks noChangeAspect="1"/>
+          </p:cNvPicPr>
+          <p:nvPr/>
+        </p:nvPicPr>
+        <p:blipFill>
+          <a:blip r:embed="rId3"/>
+          <a:stretch>
+            <a:fillRect/>
+          </a:stretch>
+        </p:blipFill>
+        <p:spPr>
+          <a:xfrm>
+            <a:off x="8467208" y="1997216"/>
+            <a:ext cx="248400" cy="248400"/>
+          </a:xfrm>
+          <a:prstGeom prst="rect">
+            <a:avLst/>
+          </a:prstGeom>
+        </p:spPr>
+      </p:pic>
+      <p:pic>
+        <p:nvPicPr>
+          <p:cNvPr id="21" name="Picture 2" descr="http://vitamin-c.vitamin-power.eu/assets/images/Gruener-Haken.jpg"/>
           <p:cNvPicPr>
             <a:picLocks noChangeAspect="1" noChangeArrowheads="1"/>
           </p:cNvPicPr>
           <p:nvPr/>
         </p:nvPicPr>
         <p:blipFill>
-          <a:blip r:embed="rId3">
+          <a:blip r:embed="rId4">
             <a:extLst>
               <a:ext uri="{28A0092B-C50C-407E-A947-70E740481C1C}">
                 <a14:useLocalDpi xmlns:a14="http://schemas.microsoft.com/office/drawing/2010/main" val="0"/>
@@ -7909,7 +8202,7 @@
         </p:blipFill>
         <p:spPr bwMode="auto">
           <a:xfrm>
-            <a:off x="8470900" y="1256807"/>
+            <a:off x="8468131" y="2753841"/>
             <a:ext cx="246554" cy="246554"/>
           </a:xfrm>
           <a:prstGeom prst="rect">
@@ -7925,30 +8218,6 @@
               </a14:hiddenFill>
             </a:ext>
           </a:extLst>
-        </p:spPr>
-      </p:pic>
-      <p:pic>
-        <p:nvPicPr>
-          <p:cNvPr id="8" name="Grafik 7"/>
-          <p:cNvPicPr>
-            <a:picLocks noChangeAspect="1"/>
-          </p:cNvPicPr>
-          <p:nvPr/>
-        </p:nvPicPr>
-        <p:blipFill>
-          <a:blip r:embed="rId4"/>
-          <a:stretch>
-            <a:fillRect/>
-          </a:stretch>
-        </p:blipFill>
-        <p:spPr>
-          <a:xfrm>
-            <a:off x="8470900" y="1636380"/>
-            <a:ext cx="248400" cy="248400"/>
-          </a:xfrm>
-          <a:prstGeom prst="rect">
-            <a:avLst/>
-          </a:prstGeom>
         </p:spPr>
       </p:pic>
     </p:spTree>
@@ -8322,6 +8591,184 @@
           <a:prstGeom prst="rect">
             <a:avLst/>
           </a:prstGeom>
+        </p:spPr>
+      </p:pic>
+      <p:pic>
+        <p:nvPicPr>
+          <p:cNvPr id="6" name="Grafik 5"/>
+          <p:cNvPicPr>
+            <a:picLocks noChangeAspect="1"/>
+          </p:cNvPicPr>
+          <p:nvPr/>
+        </p:nvPicPr>
+        <p:blipFill>
+          <a:blip r:embed="rId4"/>
+          <a:stretch>
+            <a:fillRect/>
+          </a:stretch>
+        </p:blipFill>
+        <p:spPr>
+          <a:xfrm>
+            <a:off x="8399960" y="2943254"/>
+            <a:ext cx="248400" cy="248400"/>
+          </a:xfrm>
+          <a:prstGeom prst="rect">
+            <a:avLst/>
+          </a:prstGeom>
+        </p:spPr>
+      </p:pic>
+      <p:pic>
+        <p:nvPicPr>
+          <p:cNvPr id="9" name="Grafik 8"/>
+          <p:cNvPicPr>
+            <a:picLocks noChangeAspect="1"/>
+          </p:cNvPicPr>
+          <p:nvPr/>
+        </p:nvPicPr>
+        <p:blipFill>
+          <a:blip r:embed="rId4"/>
+          <a:stretch>
+            <a:fillRect/>
+          </a:stretch>
+        </p:blipFill>
+        <p:spPr>
+          <a:xfrm>
+            <a:off x="8399960" y="3310328"/>
+            <a:ext cx="248400" cy="248400"/>
+          </a:xfrm>
+          <a:prstGeom prst="rect">
+            <a:avLst/>
+          </a:prstGeom>
+        </p:spPr>
+      </p:pic>
+      <p:pic>
+        <p:nvPicPr>
+          <p:cNvPr id="10" name="Grafik 9"/>
+          <p:cNvPicPr>
+            <a:picLocks noChangeAspect="1"/>
+          </p:cNvPicPr>
+          <p:nvPr/>
+        </p:nvPicPr>
+        <p:blipFill>
+          <a:blip r:embed="rId4"/>
+          <a:stretch>
+            <a:fillRect/>
+          </a:stretch>
+        </p:blipFill>
+        <p:spPr>
+          <a:xfrm>
+            <a:off x="8399960" y="3666892"/>
+            <a:ext cx="248400" cy="248400"/>
+          </a:xfrm>
+          <a:prstGeom prst="rect">
+            <a:avLst/>
+          </a:prstGeom>
+        </p:spPr>
+      </p:pic>
+      <p:pic>
+        <p:nvPicPr>
+          <p:cNvPr id="12" name="Picture 2" descr="http://vitamin-c.vitamin-power.eu/assets/images/Gruener-Haken.jpg"/>
+          <p:cNvPicPr>
+            <a:picLocks noChangeAspect="1" noChangeArrowheads="1"/>
+          </p:cNvPicPr>
+          <p:nvPr/>
+        </p:nvPicPr>
+        <p:blipFill>
+          <a:blip r:embed="rId3">
+            <a:extLst>
+              <a:ext uri="{28A0092B-C50C-407E-A947-70E740481C1C}">
+                <a14:useLocalDpi xmlns:a14="http://schemas.microsoft.com/office/drawing/2010/main" val="0"/>
+              </a:ext>
+            </a:extLst>
+          </a:blip>
+          <a:srcRect/>
+          <a:stretch>
+            <a:fillRect/>
+          </a:stretch>
+        </p:blipFill>
+        <p:spPr bwMode="auto">
+          <a:xfrm>
+            <a:off x="8394700" y="4411550"/>
+            <a:ext cx="246554" cy="246554"/>
+          </a:xfrm>
+          <a:prstGeom prst="rect">
+            <a:avLst/>
+          </a:prstGeom>
+          <a:noFill/>
+          <a:extLst>
+            <a:ext uri="{909E8E84-426E-40DD-AFC4-6F175D3DCCD1}">
+              <a14:hiddenFill xmlns:a14="http://schemas.microsoft.com/office/drawing/2010/main">
+                <a:solidFill>
+                  <a:srgbClr val="FFFFFF"/>
+                </a:solidFill>
+              </a14:hiddenFill>
+            </a:ext>
+          </a:extLst>
+        </p:spPr>
+      </p:pic>
+      <p:pic>
+        <p:nvPicPr>
+          <p:cNvPr id="13" name="Grafik 12"/>
+          <p:cNvPicPr>
+            <a:picLocks noChangeAspect="1"/>
+          </p:cNvPicPr>
+          <p:nvPr/>
+        </p:nvPicPr>
+        <p:blipFill>
+          <a:blip r:embed="rId4"/>
+          <a:stretch>
+            <a:fillRect/>
+          </a:stretch>
+        </p:blipFill>
+        <p:spPr>
+          <a:xfrm>
+            <a:off x="8399960" y="4782222"/>
+            <a:ext cx="248400" cy="248400"/>
+          </a:xfrm>
+          <a:prstGeom prst="rect">
+            <a:avLst/>
+          </a:prstGeom>
+        </p:spPr>
+      </p:pic>
+      <p:pic>
+        <p:nvPicPr>
+          <p:cNvPr id="11" name="Picture 2" descr="http://vitamin-c.vitamin-power.eu/assets/images/Gruener-Haken.jpg"/>
+          <p:cNvPicPr>
+            <a:picLocks noChangeAspect="1" noChangeArrowheads="1"/>
+          </p:cNvPicPr>
+          <p:nvPr/>
+        </p:nvPicPr>
+        <p:blipFill>
+          <a:blip r:embed="rId3">
+            <a:extLst>
+              <a:ext uri="{28A0092B-C50C-407E-A947-70E740481C1C}">
+                <a14:useLocalDpi xmlns:a14="http://schemas.microsoft.com/office/drawing/2010/main" val="0"/>
+              </a:ext>
+            </a:extLst>
+          </a:blip>
+          <a:srcRect/>
+          <a:stretch>
+            <a:fillRect/>
+          </a:stretch>
+        </p:blipFill>
+        <p:spPr bwMode="auto">
+          <a:xfrm>
+            <a:off x="8401806" y="4040878"/>
+            <a:ext cx="246554" cy="246554"/>
+          </a:xfrm>
+          <a:prstGeom prst="rect">
+            <a:avLst/>
+          </a:prstGeom>
+          <a:noFill/>
+          <a:extLst>
+            <a:ext uri="{909E8E84-426E-40DD-AFC4-6F175D3DCCD1}">
+              <a14:hiddenFill xmlns:a14="http://schemas.microsoft.com/office/drawing/2010/main">
+                <a:solidFill>
+                  <a:srgbClr val="FFFFFF"/>
+                </a:solidFill>
+              </a14:hiddenFill>
+            </a:ext>
+          </a:extLst>
         </p:spPr>
       </p:pic>
     </p:spTree>

</xml_diff>

<commit_message>
Adapted logger properties, presentation final version
</commit_message>
<xml_diff>
--- a/docs/IR1.pptx
+++ b/docs/IR1.pptx
@@ -10,8 +10,8 @@
   <p:sldIdLst>
     <p:sldId id="256" r:id="rId2"/>
     <p:sldId id="257" r:id="rId3"/>
-    <p:sldId id="258" r:id="rId4"/>
-    <p:sldId id="259" r:id="rId5"/>
+    <p:sldId id="259" r:id="rId4"/>
+    <p:sldId id="258" r:id="rId5"/>
     <p:sldId id="260" r:id="rId6"/>
   </p:sldIdLst>
   <p:sldSz cx="12192000" cy="6858000"/>
@@ -201,7 +201,7 @@
           <a:p>
             <a:fld id="{D0C85FD9-566C-4982-9C2E-F46B57D7177D}" type="datetimeFigureOut">
               <a:rPr lang="de-AT" smtClean="0"/>
-              <a:t>15.05.2014</a:t>
+              <a:t>16.05.2014</a:t>
             </a:fld>
             <a:endParaRPr lang="de-AT"/>
           </a:p>
@@ -515,7 +515,15 @@
           <a:p>
             <a:r>
               <a:rPr lang="de-AT" dirty="0" err="1" smtClean="0"/>
-              <a:t>Wire</a:t>
+              <a:t>file</a:t>
+            </a:r>
+            <a:r>
+              <a:rPr lang="de-AT" dirty="0" smtClean="0"/>
+              <a:t> Read Guide.xml </a:t>
+            </a:r>
+            <a:r>
+              <a:rPr lang="de-AT" dirty="0" err="1" smtClean="0"/>
+              <a:t>file</a:t>
             </a:r>
             <a:r>
               <a:rPr lang="de-AT" dirty="0" smtClean="0"/>
@@ -523,15 +531,71 @@
             </a:r>
             <a:r>
               <a:rPr lang="de-AT" dirty="0" err="1" smtClean="0"/>
-              <a:t>Tap</a:t>
+              <a:t>sql</a:t>
             </a:r>
             <a:r>
               <a:rPr lang="de-AT" dirty="0" smtClean="0"/>
-              <a:t> Backup </a:t>
+              <a:t> Read/Save </a:t>
             </a:r>
             <a:r>
               <a:rPr lang="de-AT" dirty="0" err="1" smtClean="0"/>
-              <a:t>series</a:t>
+              <a:t>from</a:t>
+            </a:r>
+            <a:r>
+              <a:rPr lang="de-AT" dirty="0" smtClean="0"/>
+              <a:t>/</a:t>
+            </a:r>
+            <a:r>
+              <a:rPr lang="de-AT" dirty="0" err="1" smtClean="0"/>
+              <a:t>to</a:t>
+            </a:r>
+            <a:r>
+              <a:rPr lang="de-AT" dirty="0" smtClean="0"/>
+              <a:t> SQL Database </a:t>
+            </a:r>
+            <a:r>
+              <a:rPr lang="de-AT" dirty="0" err="1" smtClean="0"/>
+              <a:t>facebook</a:t>
+            </a:r>
+            <a:r>
+              <a:rPr lang="de-AT" dirty="0" smtClean="0"/>
+              <a:t> Post </a:t>
+            </a:r>
+            <a:r>
+              <a:rPr lang="de-AT" dirty="0" err="1" smtClean="0"/>
+              <a:t>to</a:t>
+            </a:r>
+            <a:r>
+              <a:rPr lang="de-AT" dirty="0" smtClean="0"/>
+              <a:t> Facebook </a:t>
+            </a:r>
+            <a:r>
+              <a:rPr lang="de-AT" dirty="0" err="1" smtClean="0"/>
+              <a:t>twitter</a:t>
+            </a:r>
+            <a:r>
+              <a:rPr lang="de-AT" dirty="0" smtClean="0"/>
+              <a:t> Post Twitter </a:t>
+            </a:r>
+            <a:r>
+              <a:rPr lang="de-AT" dirty="0" err="1" smtClean="0"/>
+              <a:t>rest</a:t>
+            </a:r>
+            <a:r>
+              <a:rPr lang="de-AT" dirty="0" smtClean="0"/>
+              <a:t> Request </a:t>
+            </a:r>
+            <a:r>
+              <a:rPr lang="de-AT" dirty="0" err="1" smtClean="0"/>
+              <a:t>IMDb</a:t>
+            </a:r>
+            <a:r>
+              <a:rPr lang="de-AT" dirty="0" smtClean="0"/>
+              <a:t> via REST </a:t>
+            </a:r>
+            <a:r>
+              <a:rPr lang="de-AT" dirty="0" err="1" smtClean="0"/>
+              <a:t>smtp</a:t>
             </a:r>
             <a:r>
               <a:rPr lang="de-AT" dirty="0" smtClean="0"/>
@@ -539,7 +603,15 @@
             </a:r>
             <a:r>
               <a:rPr lang="de-AT" dirty="0" err="1" smtClean="0"/>
-              <a:t>Publish</a:t>
+              <a:t>Receiving</a:t>
+            </a:r>
+            <a:r>
+              <a:rPr lang="de-AT" dirty="0" smtClean="0"/>
+              <a:t>/</a:t>
+            </a:r>
+            <a:r>
+              <a:rPr lang="de-AT" dirty="0" err="1" smtClean="0"/>
+              <a:t>Sending</a:t>
             </a:r>
             <a:r>
               <a:rPr lang="de-AT" dirty="0" smtClean="0"/>
@@ -547,31 +619,7 @@
             </a:r>
             <a:r>
               <a:rPr lang="de-AT" dirty="0" err="1" smtClean="0"/>
-              <a:t>Subscribe</a:t>
-            </a:r>
-            <a:r>
-              <a:rPr lang="de-AT" dirty="0" smtClean="0"/>
-              <a:t> Newsletter </a:t>
-            </a:r>
-            <a:r>
-              <a:rPr lang="de-AT" dirty="0" err="1" smtClean="0"/>
-              <a:t>Polling</a:t>
-            </a:r>
-            <a:r>
-              <a:rPr lang="de-AT" dirty="0" smtClean="0"/>
-              <a:t> Consumer </a:t>
-            </a:r>
-            <a:r>
-              <a:rPr lang="de-AT" dirty="0" err="1" smtClean="0"/>
-              <a:t>Fetch</a:t>
-            </a:r>
-            <a:r>
-              <a:rPr lang="de-AT" dirty="0" smtClean="0"/>
-              <a:t>/Update </a:t>
-            </a:r>
-            <a:r>
-              <a:rPr lang="de-AT" dirty="0" err="1" smtClean="0"/>
-              <a:t>series</a:t>
+              <a:t>emails</a:t>
             </a:r>
             <a:r>
               <a:rPr lang="de-AT" dirty="0" smtClean="0"/>
@@ -579,7 +627,15 @@
             </a:r>
             <a:r>
               <a:rPr lang="de-AT" dirty="0" err="1" smtClean="0"/>
-              <a:t>data</a:t>
+              <a:t>mock</a:t>
+            </a:r>
+            <a:r>
+              <a:rPr lang="de-AT" dirty="0" smtClean="0"/>
+              <a:t> OR </a:t>
+            </a:r>
+            <a:r>
+              <a:rPr lang="de-AT" dirty="0" err="1" smtClean="0"/>
+              <a:t>test</a:t>
             </a:r>
             <a:r>
               <a:rPr lang="de-AT" dirty="0" smtClean="0"/>
@@ -587,7 +643,7 @@
             </a:r>
             <a:r>
               <a:rPr lang="de-AT" dirty="0" err="1" smtClean="0"/>
-              <a:t>every</a:t>
+              <a:t>mock</a:t>
             </a:r>
             <a:r>
               <a:rPr lang="de-AT" dirty="0" smtClean="0"/>
@@ -595,15 +651,7 @@
             </a:r>
             <a:r>
               <a:rPr lang="de-AT" dirty="0" err="1" smtClean="0"/>
-              <a:t>day</a:t>
-            </a:r>
-            <a:r>
-              <a:rPr lang="de-AT" dirty="0" smtClean="0"/>
-              <a:t> at 00:00 Content </a:t>
-            </a:r>
-            <a:r>
-              <a:rPr lang="de-AT" dirty="0" err="1" smtClean="0"/>
-              <a:t>Enricher</a:t>
+              <a:t>or</a:t>
             </a:r>
             <a:r>
               <a:rPr lang="de-AT" dirty="0" smtClean="0"/>
@@ -611,7 +659,7 @@
             </a:r>
             <a:r>
               <a:rPr lang="de-AT" dirty="0" err="1" smtClean="0"/>
-              <a:t>Attach</a:t>
+              <a:t>test</a:t>
             </a:r>
             <a:r>
               <a:rPr lang="de-AT" dirty="0" smtClean="0"/>
@@ -619,7 +667,7 @@
             </a:r>
             <a:r>
               <a:rPr lang="de-AT" dirty="0" err="1" smtClean="0"/>
-              <a:t>official</a:t>
+              <a:t>component</a:t>
             </a:r>
             <a:r>
               <a:rPr lang="de-AT" dirty="0" smtClean="0"/>
@@ -627,7 +675,39 @@
             </a:r>
             <a:r>
               <a:rPr lang="de-AT" dirty="0" err="1" smtClean="0"/>
-              <a:t>ratings</a:t>
+              <a:t>for</a:t>
+            </a:r>
+            <a:r>
+              <a:rPr lang="de-AT" dirty="0" smtClean="0"/>
+              <a:t> Unit </a:t>
+            </a:r>
+            <a:r>
+              <a:rPr lang="de-AT" dirty="0" err="1" smtClean="0"/>
+              <a:t>testing</a:t>
+            </a:r>
+            <a:r>
+              <a:rPr lang="de-AT" dirty="0" smtClean="0"/>
+              <a:t> (</a:t>
+            </a:r>
+            <a:r>
+              <a:rPr lang="de-AT" dirty="0" err="1" smtClean="0"/>
+              <a:t>depends</a:t>
+            </a:r>
+            <a:r>
+              <a:rPr lang="de-AT" dirty="0" smtClean="0"/>
+              <a:t> on </a:t>
+            </a:r>
+            <a:r>
+              <a:rPr lang="de-AT" dirty="0" err="1" smtClean="0"/>
+              <a:t>impl</a:t>
+            </a:r>
+            <a:r>
+              <a:rPr lang="de-AT" dirty="0" smtClean="0"/>
+              <a:t>.) </a:t>
+            </a:r>
+            <a:r>
+              <a:rPr lang="de-AT" dirty="0" err="1" smtClean="0"/>
+              <a:t>cxf</a:t>
             </a:r>
             <a:r>
               <a:rPr lang="de-AT" dirty="0" smtClean="0"/>
@@ -635,275 +715,19 @@
             </a:r>
             <a:r>
               <a:rPr lang="de-AT" dirty="0" err="1" smtClean="0"/>
-              <a:t>to</a:t>
+              <a:t>Receiving</a:t>
+            </a:r>
+            <a:r>
+              <a:rPr lang="de-AT" dirty="0" smtClean="0"/>
+              <a:t> SOAP </a:t>
+            </a:r>
+            <a:r>
+              <a:rPr lang="de-AT" dirty="0" err="1" smtClean="0"/>
+              <a:t>messages</a:t>
             </a:r>
             <a:r>
               <a:rPr lang="de-AT" dirty="0" smtClean="0"/>
               <a:t> </a:t>
-            </a:r>
-            <a:r>
-              <a:rPr lang="de-AT" dirty="0" err="1" smtClean="0"/>
-              <a:t>series</a:t>
-            </a:r>
-            <a:r>
-              <a:rPr lang="de-AT" dirty="0" smtClean="0"/>
-              <a:t> (</a:t>
-            </a:r>
-            <a:r>
-              <a:rPr lang="de-AT" dirty="0" err="1" smtClean="0"/>
-              <a:t>eg</a:t>
-            </a:r>
-            <a:r>
-              <a:rPr lang="de-AT" dirty="0" smtClean="0"/>
-              <a:t>. </a:t>
-            </a:r>
-            <a:r>
-              <a:rPr lang="de-AT" dirty="0" err="1" smtClean="0"/>
-              <a:t>from</a:t>
-            </a:r>
-            <a:r>
-              <a:rPr lang="de-AT" dirty="0" smtClean="0"/>
-              <a:t> imdb.com) </a:t>
-            </a:r>
-            <a:r>
-              <a:rPr lang="de-AT" dirty="0" err="1" smtClean="0"/>
-              <a:t>Normalizer</a:t>
-            </a:r>
-            <a:r>
-              <a:rPr lang="de-AT" dirty="0" smtClean="0"/>
-              <a:t> </a:t>
-            </a:r>
-            <a:r>
-              <a:rPr lang="de-AT" dirty="0" err="1" smtClean="0"/>
-              <a:t>Normalize</a:t>
-            </a:r>
-            <a:r>
-              <a:rPr lang="de-AT" dirty="0" smtClean="0"/>
-              <a:t> </a:t>
-            </a:r>
-            <a:r>
-              <a:rPr lang="de-AT" dirty="0" err="1" smtClean="0"/>
-              <a:t>ratings</a:t>
-            </a:r>
-            <a:r>
-              <a:rPr lang="de-AT" dirty="0" smtClean="0"/>
-              <a:t> </a:t>
-            </a:r>
-            <a:r>
-              <a:rPr lang="de-AT" dirty="0" err="1" smtClean="0"/>
-              <a:t>from</a:t>
-            </a:r>
-            <a:r>
-              <a:rPr lang="de-AT" dirty="0" smtClean="0"/>
-              <a:t> different </a:t>
-            </a:r>
-            <a:r>
-              <a:rPr lang="de-AT" dirty="0" err="1" smtClean="0"/>
-              <a:t>sources</a:t>
-            </a:r>
-            <a:r>
-              <a:rPr lang="de-AT" dirty="0" smtClean="0"/>
-              <a:t> </a:t>
-            </a:r>
-            <a:r>
-              <a:rPr lang="de-AT" dirty="0" err="1" smtClean="0"/>
-              <a:t>Recipient</a:t>
-            </a:r>
-            <a:r>
-              <a:rPr lang="de-AT" dirty="0" smtClean="0"/>
-              <a:t> List Updates: Twitter, Facebook, Database Message Filter </a:t>
-            </a:r>
-            <a:r>
-              <a:rPr lang="de-AT" dirty="0" err="1" smtClean="0"/>
-              <a:t>Discard</a:t>
-            </a:r>
-            <a:r>
-              <a:rPr lang="de-AT" dirty="0" smtClean="0"/>
-              <a:t> </a:t>
-            </a:r>
-            <a:r>
-              <a:rPr lang="de-AT" dirty="0" err="1" smtClean="0"/>
-              <a:t>duplicate</a:t>
-            </a:r>
-            <a:r>
-              <a:rPr lang="de-AT" dirty="0" smtClean="0"/>
-              <a:t> </a:t>
-            </a:r>
-            <a:r>
-              <a:rPr lang="de-AT" dirty="0" err="1" smtClean="0"/>
-              <a:t>records</a:t>
-            </a:r>
-            <a:r>
-              <a:rPr lang="de-AT" dirty="0" smtClean="0"/>
-              <a:t> Dead Letter Channel </a:t>
-            </a:r>
-            <a:r>
-              <a:rPr lang="de-AT" dirty="0" err="1" smtClean="0"/>
-              <a:t>If</a:t>
-            </a:r>
-            <a:r>
-              <a:rPr lang="de-AT" dirty="0" smtClean="0"/>
-              <a:t> </a:t>
-            </a:r>
-            <a:r>
-              <a:rPr lang="de-AT" dirty="0" err="1" smtClean="0"/>
-              <a:t>exceptions</a:t>
-            </a:r>
-            <a:r>
-              <a:rPr lang="de-AT" dirty="0" smtClean="0"/>
-              <a:t> </a:t>
-            </a:r>
-            <a:r>
-              <a:rPr lang="de-AT" dirty="0" err="1" smtClean="0"/>
-              <a:t>occur</a:t>
-            </a:r>
-            <a:r>
-              <a:rPr lang="de-AT" dirty="0" smtClean="0"/>
-              <a:t>, send </a:t>
-            </a:r>
-            <a:r>
-              <a:rPr lang="de-AT" dirty="0" err="1" smtClean="0"/>
-              <a:t>message</a:t>
-            </a:r>
-            <a:r>
-              <a:rPr lang="de-AT" dirty="0" smtClean="0"/>
-              <a:t> </a:t>
-            </a:r>
-            <a:r>
-              <a:rPr lang="de-AT" dirty="0" err="1" smtClean="0"/>
-              <a:t>to</a:t>
-            </a:r>
-            <a:r>
-              <a:rPr lang="de-AT" dirty="0" smtClean="0"/>
-              <a:t> </a:t>
-            </a:r>
-            <a:r>
-              <a:rPr lang="de-AT" dirty="0" err="1" smtClean="0"/>
-              <a:t>dead</a:t>
-            </a:r>
-            <a:r>
-              <a:rPr lang="de-AT" dirty="0" smtClean="0"/>
-              <a:t> </a:t>
-            </a:r>
-            <a:r>
-              <a:rPr lang="de-AT" dirty="0" err="1" smtClean="0"/>
-              <a:t>letter</a:t>
-            </a:r>
-            <a:r>
-              <a:rPr lang="de-AT" dirty="0" smtClean="0"/>
-              <a:t> </a:t>
-            </a:r>
-            <a:r>
-              <a:rPr lang="de-AT" dirty="0" err="1" smtClean="0"/>
-              <a:t>channel</a:t>
-            </a:r>
-            <a:r>
-              <a:rPr lang="de-AT" dirty="0" smtClean="0"/>
-              <a:t> </a:t>
-            </a:r>
-            <a:r>
-              <a:rPr lang="de-AT" dirty="0" err="1" smtClean="0"/>
-              <a:t>Aggregator</a:t>
-            </a:r>
-            <a:r>
-              <a:rPr lang="de-AT" dirty="0" smtClean="0"/>
-              <a:t> Aggregate </a:t>
-            </a:r>
-            <a:r>
-              <a:rPr lang="de-AT" dirty="0" err="1" smtClean="0"/>
-              <a:t>series</a:t>
-            </a:r>
-            <a:r>
-              <a:rPr lang="de-AT" dirty="0" smtClean="0"/>
-              <a:t> </a:t>
-            </a:r>
-            <a:r>
-              <a:rPr lang="de-AT" dirty="0" err="1" smtClean="0"/>
-              <a:t>for</a:t>
-            </a:r>
-            <a:r>
-              <a:rPr lang="de-AT" dirty="0" smtClean="0"/>
-              <a:t> </a:t>
-            </a:r>
-            <a:r>
-              <a:rPr lang="de-AT" dirty="0" err="1" smtClean="0"/>
-              <a:t>newsletter</a:t>
-            </a:r>
-            <a:r>
-              <a:rPr lang="de-AT" dirty="0" smtClean="0"/>
-              <a:t> Message </a:t>
-            </a:r>
-            <a:r>
-              <a:rPr lang="de-AT" dirty="0" err="1" smtClean="0"/>
-              <a:t>History</a:t>
-            </a:r>
-            <a:r>
-              <a:rPr lang="de-AT" dirty="0" smtClean="0"/>
-              <a:t> </a:t>
-            </a:r>
-            <a:r>
-              <a:rPr lang="de-AT" dirty="0" err="1" smtClean="0"/>
-              <a:t>Backtrace</a:t>
-            </a:r>
-            <a:r>
-              <a:rPr lang="de-AT" dirty="0" smtClean="0"/>
-              <a:t> </a:t>
-            </a:r>
-            <a:r>
-              <a:rPr lang="de-AT" dirty="0" err="1" smtClean="0"/>
-              <a:t>messages</a:t>
-            </a:r>
-            <a:r>
-              <a:rPr lang="de-AT" dirty="0" smtClean="0"/>
-              <a:t> Event </a:t>
-            </a:r>
-            <a:r>
-              <a:rPr lang="de-AT" dirty="0" err="1" smtClean="0"/>
-              <a:t>driven</a:t>
-            </a:r>
-            <a:r>
-              <a:rPr lang="de-AT" dirty="0" smtClean="0"/>
-              <a:t> </a:t>
-            </a:r>
-            <a:r>
-              <a:rPr lang="de-AT" dirty="0" err="1" smtClean="0"/>
-              <a:t>consumer</a:t>
-            </a:r>
-            <a:r>
-              <a:rPr lang="de-AT" dirty="0" smtClean="0"/>
-              <a:t> </a:t>
-            </a:r>
-            <a:r>
-              <a:rPr lang="de-AT" dirty="0" err="1" smtClean="0"/>
-              <a:t>Process</a:t>
-            </a:r>
-            <a:r>
-              <a:rPr lang="de-AT" dirty="0" smtClean="0"/>
-              <a:t> </a:t>
-            </a:r>
-            <a:r>
-              <a:rPr lang="de-AT" dirty="0" err="1" smtClean="0"/>
-              <a:t>incoming</a:t>
-            </a:r>
-            <a:r>
-              <a:rPr lang="de-AT" dirty="0" smtClean="0"/>
-              <a:t> </a:t>
-            </a:r>
-            <a:r>
-              <a:rPr lang="de-AT" dirty="0" err="1" smtClean="0"/>
-              <a:t>mails</a:t>
-            </a:r>
-            <a:r>
-              <a:rPr lang="de-AT" dirty="0" smtClean="0"/>
-              <a:t> (event-</a:t>
-            </a:r>
-            <a:r>
-              <a:rPr lang="de-AT" dirty="0" err="1" smtClean="0"/>
-              <a:t>based</a:t>
-            </a:r>
-            <a:r>
-              <a:rPr lang="de-AT" dirty="0" smtClean="0"/>
-              <a:t>) </a:t>
             </a:r>
             <a:endParaRPr lang="de-AT" dirty="0"/>
           </a:p>
@@ -935,7 +759,7 @@
     </p:spTree>
     <p:extLst>
       <p:ext uri="{BB962C8B-B14F-4D97-AF65-F5344CB8AC3E}">
-        <p14:creationId xmlns:p14="http://schemas.microsoft.com/office/powerpoint/2010/main" val="1007246872"/>
+        <p14:creationId xmlns:p14="http://schemas.microsoft.com/office/powerpoint/2010/main" val="4007045922"/>
       </p:ext>
     </p:extLst>
   </p:cSld>
@@ -991,15 +815,7 @@
           <a:p>
             <a:r>
               <a:rPr lang="de-AT" dirty="0" err="1" smtClean="0"/>
-              <a:t>file</a:t>
-            </a:r>
-            <a:r>
-              <a:rPr lang="de-AT" dirty="0" smtClean="0"/>
-              <a:t> Read Guide.xml </a:t>
-            </a:r>
-            <a:r>
-              <a:rPr lang="de-AT" dirty="0" err="1" smtClean="0"/>
-              <a:t>file</a:t>
+              <a:t>Wire</a:t>
             </a:r>
             <a:r>
               <a:rPr lang="de-AT" dirty="0" smtClean="0"/>
@@ -1007,11 +823,139 @@
             </a:r>
             <a:r>
               <a:rPr lang="de-AT" dirty="0" err="1" smtClean="0"/>
-              <a:t>sql</a:t>
+              <a:t>Tap</a:t>
             </a:r>
             <a:r>
               <a:rPr lang="de-AT" dirty="0" smtClean="0"/>
-              <a:t> Read/Save </a:t>
+              <a:t> Backup </a:t>
+            </a:r>
+            <a:r>
+              <a:rPr lang="de-AT" dirty="0" err="1" smtClean="0"/>
+              <a:t>series</a:t>
+            </a:r>
+            <a:r>
+              <a:rPr lang="de-AT" dirty="0" smtClean="0"/>
+              <a:t> </a:t>
+            </a:r>
+            <a:r>
+              <a:rPr lang="de-AT" dirty="0" err="1" smtClean="0"/>
+              <a:t>Publish</a:t>
+            </a:r>
+            <a:r>
+              <a:rPr lang="de-AT" dirty="0" smtClean="0"/>
+              <a:t> </a:t>
+            </a:r>
+            <a:r>
+              <a:rPr lang="de-AT" dirty="0" err="1" smtClean="0"/>
+              <a:t>Subscribe</a:t>
+            </a:r>
+            <a:r>
+              <a:rPr lang="de-AT" dirty="0" smtClean="0"/>
+              <a:t> Newsletter </a:t>
+            </a:r>
+            <a:r>
+              <a:rPr lang="de-AT" dirty="0" err="1" smtClean="0"/>
+              <a:t>Polling</a:t>
+            </a:r>
+            <a:r>
+              <a:rPr lang="de-AT" dirty="0" smtClean="0"/>
+              <a:t> Consumer </a:t>
+            </a:r>
+            <a:r>
+              <a:rPr lang="de-AT" dirty="0" err="1" smtClean="0"/>
+              <a:t>Fetch</a:t>
+            </a:r>
+            <a:r>
+              <a:rPr lang="de-AT" dirty="0" smtClean="0"/>
+              <a:t>/Update </a:t>
+            </a:r>
+            <a:r>
+              <a:rPr lang="de-AT" dirty="0" err="1" smtClean="0"/>
+              <a:t>series</a:t>
+            </a:r>
+            <a:r>
+              <a:rPr lang="de-AT" dirty="0" smtClean="0"/>
+              <a:t> </a:t>
+            </a:r>
+            <a:r>
+              <a:rPr lang="de-AT" dirty="0" err="1" smtClean="0"/>
+              <a:t>data</a:t>
+            </a:r>
+            <a:r>
+              <a:rPr lang="de-AT" dirty="0" smtClean="0"/>
+              <a:t> </a:t>
+            </a:r>
+            <a:r>
+              <a:rPr lang="de-AT" dirty="0" err="1" smtClean="0"/>
+              <a:t>every</a:t>
+            </a:r>
+            <a:r>
+              <a:rPr lang="de-AT" dirty="0" smtClean="0"/>
+              <a:t> </a:t>
+            </a:r>
+            <a:r>
+              <a:rPr lang="de-AT" dirty="0" err="1" smtClean="0"/>
+              <a:t>day</a:t>
+            </a:r>
+            <a:r>
+              <a:rPr lang="de-AT" dirty="0" smtClean="0"/>
+              <a:t> at 00:00 Content </a:t>
+            </a:r>
+            <a:r>
+              <a:rPr lang="de-AT" dirty="0" err="1" smtClean="0"/>
+              <a:t>Enricher</a:t>
+            </a:r>
+            <a:r>
+              <a:rPr lang="de-AT" dirty="0" smtClean="0"/>
+              <a:t> </a:t>
+            </a:r>
+            <a:r>
+              <a:rPr lang="de-AT" dirty="0" err="1" smtClean="0"/>
+              <a:t>Attach</a:t>
+            </a:r>
+            <a:r>
+              <a:rPr lang="de-AT" dirty="0" smtClean="0"/>
+              <a:t> </a:t>
+            </a:r>
+            <a:r>
+              <a:rPr lang="de-AT" dirty="0" err="1" smtClean="0"/>
+              <a:t>official</a:t>
+            </a:r>
+            <a:r>
+              <a:rPr lang="de-AT" dirty="0" smtClean="0"/>
+              <a:t> </a:t>
+            </a:r>
+            <a:r>
+              <a:rPr lang="de-AT" dirty="0" err="1" smtClean="0"/>
+              <a:t>ratings</a:t>
+            </a:r>
+            <a:r>
+              <a:rPr lang="de-AT" dirty="0" smtClean="0"/>
+              <a:t> </a:t>
+            </a:r>
+            <a:r>
+              <a:rPr lang="de-AT" dirty="0" err="1" smtClean="0"/>
+              <a:t>to</a:t>
+            </a:r>
+            <a:r>
+              <a:rPr lang="de-AT" dirty="0" smtClean="0"/>
+              <a:t> </a:t>
+            </a:r>
+            <a:r>
+              <a:rPr lang="de-AT" dirty="0" err="1" smtClean="0"/>
+              <a:t>series</a:t>
+            </a:r>
+            <a:r>
+              <a:rPr lang="de-AT" dirty="0" smtClean="0"/>
+              <a:t> (</a:t>
+            </a:r>
+            <a:r>
+              <a:rPr lang="de-AT" dirty="0" err="1" smtClean="0"/>
+              <a:t>eg</a:t>
+            </a:r>
+            <a:r>
+              <a:rPr lang="de-AT" dirty="0" smtClean="0"/>
+              <a:t>. </a:t>
             </a:r>
             <a:r>
               <a:rPr lang="de-AT" dirty="0" err="1" smtClean="0"/>
@@ -1019,7 +963,111 @@
             </a:r>
             <a:r>
               <a:rPr lang="de-AT" dirty="0" smtClean="0"/>
-              <a:t>/</a:t>
+              <a:t> imdb.com) </a:t>
+            </a:r>
+            <a:r>
+              <a:rPr lang="de-AT" dirty="0" err="1" smtClean="0"/>
+              <a:t>Normalizer</a:t>
+            </a:r>
+            <a:r>
+              <a:rPr lang="de-AT" dirty="0" smtClean="0"/>
+              <a:t> </a:t>
+            </a:r>
+            <a:r>
+              <a:rPr lang="de-AT" dirty="0" err="1" smtClean="0"/>
+              <a:t>Normalize</a:t>
+            </a:r>
+            <a:r>
+              <a:rPr lang="de-AT" dirty="0" smtClean="0"/>
+              <a:t> </a:t>
+            </a:r>
+            <a:r>
+              <a:rPr lang="de-AT" dirty="0" err="1" smtClean="0"/>
+              <a:t>ratings</a:t>
+            </a:r>
+            <a:r>
+              <a:rPr lang="de-AT" dirty="0" smtClean="0"/>
+              <a:t> </a:t>
+            </a:r>
+            <a:r>
+              <a:rPr lang="de-AT" dirty="0" err="1" smtClean="0"/>
+              <a:t>from</a:t>
+            </a:r>
+            <a:r>
+              <a:rPr lang="de-AT" dirty="0" smtClean="0"/>
+              <a:t> different </a:t>
+            </a:r>
+            <a:r>
+              <a:rPr lang="de-AT" dirty="0" err="1" smtClean="0"/>
+              <a:t>sources</a:t>
+            </a:r>
+            <a:r>
+              <a:rPr lang="de-AT" dirty="0" smtClean="0"/>
+              <a:t> </a:t>
+            </a:r>
+            <a:r>
+              <a:rPr lang="de-AT" dirty="0" err="1" smtClean="0"/>
+              <a:t>Recipient</a:t>
+            </a:r>
+            <a:r>
+              <a:rPr lang="de-AT" dirty="0" smtClean="0"/>
+              <a:t> List Updates: Twitter, Facebook, Database Message Filter </a:t>
+            </a:r>
+            <a:r>
+              <a:rPr lang="de-AT" dirty="0" err="1" smtClean="0"/>
+              <a:t>Discard</a:t>
+            </a:r>
+            <a:r>
+              <a:rPr lang="de-AT" dirty="0" smtClean="0"/>
+              <a:t> </a:t>
+            </a:r>
+            <a:r>
+              <a:rPr lang="de-AT" dirty="0" err="1" smtClean="0"/>
+              <a:t>duplicate</a:t>
+            </a:r>
+            <a:r>
+              <a:rPr lang="de-AT" dirty="0" smtClean="0"/>
+              <a:t> </a:t>
+            </a:r>
+            <a:r>
+              <a:rPr lang="de-AT" dirty="0" err="1" smtClean="0"/>
+              <a:t>records</a:t>
+            </a:r>
+            <a:r>
+              <a:rPr lang="de-AT" dirty="0" smtClean="0"/>
+              <a:t> Dead Letter Channel </a:t>
+            </a:r>
+            <a:r>
+              <a:rPr lang="de-AT" dirty="0" err="1" smtClean="0"/>
+              <a:t>If</a:t>
+            </a:r>
+            <a:r>
+              <a:rPr lang="de-AT" dirty="0" smtClean="0"/>
+              <a:t> </a:t>
+            </a:r>
+            <a:r>
+              <a:rPr lang="de-AT" dirty="0" err="1" smtClean="0"/>
+              <a:t>exceptions</a:t>
+            </a:r>
+            <a:r>
+              <a:rPr lang="de-AT" dirty="0" smtClean="0"/>
+              <a:t> </a:t>
+            </a:r>
+            <a:r>
+              <a:rPr lang="de-AT" dirty="0" err="1" smtClean="0"/>
+              <a:t>occur</a:t>
+            </a:r>
+            <a:r>
+              <a:rPr lang="de-AT" dirty="0" smtClean="0"/>
+              <a:t>, send </a:t>
+            </a:r>
+            <a:r>
+              <a:rPr lang="de-AT" dirty="0" err="1" smtClean="0"/>
+              <a:t>message</a:t>
+            </a:r>
+            <a:r>
+              <a:rPr lang="de-AT" dirty="0" smtClean="0"/>
+              <a:t> </a:t>
             </a:r>
             <a:r>
               <a:rPr lang="de-AT" dirty="0" err="1" smtClean="0"/>
@@ -1027,51 +1075,11 @@
             </a:r>
             <a:r>
               <a:rPr lang="de-AT" dirty="0" smtClean="0"/>
-              <a:t> SQL Database </a:t>
+              <a:t> </a:t>
             </a:r>
             <a:r>
               <a:rPr lang="de-AT" dirty="0" err="1" smtClean="0"/>
-              <a:t>facebook</a:t>
-            </a:r>
-            <a:r>
-              <a:rPr lang="de-AT" dirty="0" smtClean="0"/>
-              <a:t> Post </a:t>
-            </a:r>
-            <a:r>
-              <a:rPr lang="de-AT" dirty="0" err="1" smtClean="0"/>
-              <a:t>to</a:t>
-            </a:r>
-            <a:r>
-              <a:rPr lang="de-AT" dirty="0" smtClean="0"/>
-              <a:t> Facebook </a:t>
-            </a:r>
-            <a:r>
-              <a:rPr lang="de-AT" dirty="0" err="1" smtClean="0"/>
-              <a:t>twitter</a:t>
-            </a:r>
-            <a:r>
-              <a:rPr lang="de-AT" dirty="0" smtClean="0"/>
-              <a:t> Post Twitter </a:t>
-            </a:r>
-            <a:r>
-              <a:rPr lang="de-AT" dirty="0" err="1" smtClean="0"/>
-              <a:t>rest</a:t>
-            </a:r>
-            <a:r>
-              <a:rPr lang="de-AT" dirty="0" smtClean="0"/>
-              <a:t> Request </a:t>
-            </a:r>
-            <a:r>
-              <a:rPr lang="de-AT" dirty="0" err="1" smtClean="0"/>
-              <a:t>IMDb</a:t>
-            </a:r>
-            <a:r>
-              <a:rPr lang="de-AT" dirty="0" smtClean="0"/>
-              <a:t> via REST </a:t>
-            </a:r>
-            <a:r>
-              <a:rPr lang="de-AT" dirty="0" err="1" smtClean="0"/>
-              <a:t>smtp</a:t>
+              <a:t>dead</a:t>
             </a:r>
             <a:r>
               <a:rPr lang="de-AT" dirty="0" smtClean="0"/>
@@ -1079,15 +1087,7 @@
             </a:r>
             <a:r>
               <a:rPr lang="de-AT" dirty="0" err="1" smtClean="0"/>
-              <a:t>Receiving</a:t>
-            </a:r>
-            <a:r>
-              <a:rPr lang="de-AT" dirty="0" smtClean="0"/>
-              <a:t>/</a:t>
-            </a:r>
-            <a:r>
-              <a:rPr lang="de-AT" dirty="0" err="1" smtClean="0"/>
-              <a:t>Sending</a:t>
+              <a:t>letter</a:t>
             </a:r>
             <a:r>
               <a:rPr lang="de-AT" dirty="0" smtClean="0"/>
@@ -1095,7 +1095,7 @@
             </a:r>
             <a:r>
               <a:rPr lang="de-AT" dirty="0" err="1" smtClean="0"/>
-              <a:t>emails</a:t>
+              <a:t>channel</a:t>
             </a:r>
             <a:r>
               <a:rPr lang="de-AT" dirty="0" smtClean="0"/>
@@ -1103,15 +1103,15 @@
             </a:r>
             <a:r>
               <a:rPr lang="de-AT" dirty="0" err="1" smtClean="0"/>
-              <a:t>mock</a:t>
+              <a:t>Aggregator</a:t>
             </a:r>
             <a:r>
               <a:rPr lang="de-AT" dirty="0" smtClean="0"/>
-              <a:t> OR </a:t>
+              <a:t> Aggregate </a:t>
             </a:r>
             <a:r>
               <a:rPr lang="de-AT" dirty="0" err="1" smtClean="0"/>
-              <a:t>test</a:t>
+              <a:t>series</a:t>
             </a:r>
             <a:r>
               <a:rPr lang="de-AT" dirty="0" smtClean="0"/>
@@ -1119,7 +1119,7 @@
             </a:r>
             <a:r>
               <a:rPr lang="de-AT" dirty="0" err="1" smtClean="0"/>
-              <a:t>mock</a:t>
+              <a:t>for</a:t>
             </a:r>
             <a:r>
               <a:rPr lang="de-AT" dirty="0" smtClean="0"/>
@@ -1127,7 +1127,15 @@
             </a:r>
             <a:r>
               <a:rPr lang="de-AT" dirty="0" err="1" smtClean="0"/>
-              <a:t>or</a:t>
+              <a:t>newsletter</a:t>
+            </a:r>
+            <a:r>
+              <a:rPr lang="de-AT" dirty="0" smtClean="0"/>
+              <a:t> Message </a:t>
+            </a:r>
+            <a:r>
+              <a:rPr lang="de-AT" dirty="0" err="1" smtClean="0"/>
+              <a:t>History</a:t>
             </a:r>
             <a:r>
               <a:rPr lang="de-AT" dirty="0" smtClean="0"/>
@@ -1135,7 +1143,7 @@
             </a:r>
             <a:r>
               <a:rPr lang="de-AT" dirty="0" err="1" smtClean="0"/>
-              <a:t>test</a:t>
+              <a:t>Backtrace</a:t>
             </a:r>
             <a:r>
               <a:rPr lang="de-AT" dirty="0" smtClean="0"/>
@@ -1143,7 +1151,15 @@
             </a:r>
             <a:r>
               <a:rPr lang="de-AT" dirty="0" err="1" smtClean="0"/>
-              <a:t>component</a:t>
+              <a:t>messages</a:t>
+            </a:r>
+            <a:r>
+              <a:rPr lang="de-AT" dirty="0" smtClean="0"/>
+              <a:t> Event </a:t>
+            </a:r>
+            <a:r>
+              <a:rPr lang="de-AT" dirty="0" err="1" smtClean="0"/>
+              <a:t>driven</a:t>
             </a:r>
             <a:r>
               <a:rPr lang="de-AT" dirty="0" smtClean="0"/>
@@ -1151,39 +1167,7 @@
             </a:r>
             <a:r>
               <a:rPr lang="de-AT" dirty="0" err="1" smtClean="0"/>
-              <a:t>for</a:t>
-            </a:r>
-            <a:r>
-              <a:rPr lang="de-AT" dirty="0" smtClean="0"/>
-              <a:t> Unit </a:t>
-            </a:r>
-            <a:r>
-              <a:rPr lang="de-AT" dirty="0" err="1" smtClean="0"/>
-              <a:t>testing</a:t>
-            </a:r>
-            <a:r>
-              <a:rPr lang="de-AT" dirty="0" smtClean="0"/>
-              <a:t> (</a:t>
-            </a:r>
-            <a:r>
-              <a:rPr lang="de-AT" dirty="0" err="1" smtClean="0"/>
-              <a:t>depends</a:t>
-            </a:r>
-            <a:r>
-              <a:rPr lang="de-AT" dirty="0" smtClean="0"/>
-              <a:t> on </a:t>
-            </a:r>
-            <a:r>
-              <a:rPr lang="de-AT" dirty="0" err="1" smtClean="0"/>
-              <a:t>impl</a:t>
-            </a:r>
-            <a:r>
-              <a:rPr lang="de-AT" dirty="0" smtClean="0"/>
-              <a:t>.) </a:t>
-            </a:r>
-            <a:r>
-              <a:rPr lang="de-AT" dirty="0" err="1" smtClean="0"/>
-              <a:t>cxf</a:t>
+              <a:t>consumer</a:t>
             </a:r>
             <a:r>
               <a:rPr lang="de-AT" dirty="0" smtClean="0"/>
@@ -1191,19 +1175,35 @@
             </a:r>
             <a:r>
               <a:rPr lang="de-AT" dirty="0" err="1" smtClean="0"/>
-              <a:t>Receiving</a:t>
-            </a:r>
-            <a:r>
-              <a:rPr lang="de-AT" dirty="0" smtClean="0"/>
-              <a:t> SOAP </a:t>
-            </a:r>
-            <a:r>
-              <a:rPr lang="de-AT" dirty="0" err="1" smtClean="0"/>
-              <a:t>messages</a:t>
+              <a:t>Process</a:t>
             </a:r>
             <a:r>
               <a:rPr lang="de-AT" dirty="0" smtClean="0"/>
               <a:t> </a:t>
+            </a:r>
+            <a:r>
+              <a:rPr lang="de-AT" dirty="0" err="1" smtClean="0"/>
+              <a:t>incoming</a:t>
+            </a:r>
+            <a:r>
+              <a:rPr lang="de-AT" dirty="0" smtClean="0"/>
+              <a:t> </a:t>
+            </a:r>
+            <a:r>
+              <a:rPr lang="de-AT" dirty="0" err="1" smtClean="0"/>
+              <a:t>mails</a:t>
+            </a:r>
+            <a:r>
+              <a:rPr lang="de-AT" dirty="0" smtClean="0"/>
+              <a:t> (event-</a:t>
+            </a:r>
+            <a:r>
+              <a:rPr lang="de-AT" dirty="0" err="1" smtClean="0"/>
+              <a:t>based</a:t>
+            </a:r>
+            <a:r>
+              <a:rPr lang="de-AT" dirty="0" smtClean="0"/>
+              <a:t>) </a:t>
             </a:r>
             <a:endParaRPr lang="de-AT" dirty="0"/>
           </a:p>
@@ -1235,7 +1235,7 @@
     </p:spTree>
     <p:extLst>
       <p:ext uri="{BB962C8B-B14F-4D97-AF65-F5344CB8AC3E}">
-        <p14:creationId xmlns:p14="http://schemas.microsoft.com/office/powerpoint/2010/main" val="4007045922"/>
+        <p14:creationId xmlns:p14="http://schemas.microsoft.com/office/powerpoint/2010/main" val="1007246872"/>
       </p:ext>
     </p:extLst>
   </p:cSld>
@@ -1832,7 +1832,7 @@
             <a:fld id="{B61BEF0D-F0BB-DE4B-95CE-6DB70DBA9567}" type="datetimeFigureOut">
               <a:rPr lang="en-US" dirty="0"/>
               <a:pPr/>
-              <a:t>5/15/2014</a:t>
+              <a:t>5/16/2014</a:t>
             </a:fld>
             <a:endParaRPr lang="en-US" dirty="0"/>
           </a:p>
@@ -2125,7 +2125,7 @@
             <a:fld id="{B61BEF0D-F0BB-DE4B-95CE-6DB70DBA9567}" type="datetimeFigureOut">
               <a:rPr lang="en-US" dirty="0"/>
               <a:pPr/>
-              <a:t>5/15/2014</a:t>
+              <a:t>5/16/2014</a:t>
             </a:fld>
             <a:endParaRPr lang="en-US" dirty="0"/>
           </a:p>
@@ -2370,7 +2370,7 @@
             <a:fld id="{B61BEF0D-F0BB-DE4B-95CE-6DB70DBA9567}" type="datetimeFigureOut">
               <a:rPr lang="en-US" dirty="0"/>
               <a:pPr/>
-              <a:t>5/15/2014</a:t>
+              <a:t>5/16/2014</a:t>
             </a:fld>
             <a:endParaRPr lang="en-US" dirty="0"/>
           </a:p>
@@ -2907,7 +2907,7 @@
             <a:fld id="{B61BEF0D-F0BB-DE4B-95CE-6DB70DBA9567}" type="datetimeFigureOut">
               <a:rPr lang="en-US" dirty="0"/>
               <a:pPr/>
-              <a:t>5/15/2014</a:t>
+              <a:t>5/16/2014</a:t>
             </a:fld>
             <a:endParaRPr lang="en-US" dirty="0"/>
           </a:p>
@@ -3152,7 +3152,7 @@
             <a:fld id="{B61BEF0D-F0BB-DE4B-95CE-6DB70DBA9567}" type="datetimeFigureOut">
               <a:rPr lang="en-US" dirty="0"/>
               <a:pPr/>
-              <a:t>5/15/2014</a:t>
+              <a:t>5/16/2014</a:t>
             </a:fld>
             <a:endParaRPr lang="en-US" dirty="0"/>
           </a:p>
@@ -3681,7 +3681,7 @@
             <a:fld id="{B61BEF0D-F0BB-DE4B-95CE-6DB70DBA9567}" type="datetimeFigureOut">
               <a:rPr lang="en-US" dirty="0"/>
               <a:pPr/>
-              <a:t>5/15/2014</a:t>
+              <a:t>5/16/2014</a:t>
             </a:fld>
             <a:endParaRPr lang="en-US" dirty="0"/>
           </a:p>
@@ -3975,7 +3975,7 @@
             <a:fld id="{B61BEF0D-F0BB-DE4B-95CE-6DB70DBA9567}" type="datetimeFigureOut">
               <a:rPr lang="en-US" dirty="0"/>
               <a:pPr/>
-              <a:t>5/15/2014</a:t>
+              <a:t>5/16/2014</a:t>
             </a:fld>
             <a:endParaRPr lang="en-US" dirty="0"/>
           </a:p>
@@ -4146,7 +4146,7 @@
             <a:fld id="{B61BEF0D-F0BB-DE4B-95CE-6DB70DBA9567}" type="datetimeFigureOut">
               <a:rPr lang="en-US" dirty="0"/>
               <a:pPr/>
-              <a:t>5/15/2014</a:t>
+              <a:t>5/16/2014</a:t>
             </a:fld>
             <a:endParaRPr lang="en-US" dirty="0"/>
           </a:p>
@@ -4323,7 +4323,7 @@
             <a:fld id="{B61BEF0D-F0BB-DE4B-95CE-6DB70DBA9567}" type="datetimeFigureOut">
               <a:rPr lang="en-US" dirty="0"/>
               <a:pPr/>
-              <a:t>5/15/2014</a:t>
+              <a:t>5/16/2014</a:t>
             </a:fld>
             <a:endParaRPr lang="en-US" dirty="0"/>
           </a:p>
@@ -4490,7 +4490,7 @@
             <a:fld id="{B61BEF0D-F0BB-DE4B-95CE-6DB70DBA9567}" type="datetimeFigureOut">
               <a:rPr lang="en-US" dirty="0"/>
               <a:pPr/>
-              <a:t>5/15/2014</a:t>
+              <a:t>5/16/2014</a:t>
             </a:fld>
             <a:endParaRPr lang="en-US" dirty="0"/>
           </a:p>
@@ -4738,7 +4738,7 @@
             <a:fld id="{B61BEF0D-F0BB-DE4B-95CE-6DB70DBA9567}" type="datetimeFigureOut">
               <a:rPr lang="en-US" dirty="0"/>
               <a:pPr/>
-              <a:t>5/15/2014</a:t>
+              <a:t>5/16/2014</a:t>
             </a:fld>
             <a:endParaRPr lang="en-US" dirty="0"/>
           </a:p>
@@ -5032,7 +5032,7 @@
             <a:fld id="{B61BEF0D-F0BB-DE4B-95CE-6DB70DBA9567}" type="datetimeFigureOut">
               <a:rPr lang="en-US" dirty="0"/>
               <a:pPr/>
-              <a:t>5/15/2014</a:t>
+              <a:t>5/16/2014</a:t>
             </a:fld>
             <a:endParaRPr lang="en-US" dirty="0"/>
           </a:p>
@@ -5471,7 +5471,7 @@
             <a:fld id="{B61BEF0D-F0BB-DE4B-95CE-6DB70DBA9567}" type="datetimeFigureOut">
               <a:rPr lang="en-US" dirty="0"/>
               <a:pPr/>
-              <a:t>5/15/2014</a:t>
+              <a:t>5/16/2014</a:t>
             </a:fld>
             <a:endParaRPr lang="en-US" dirty="0"/>
           </a:p>
@@ -5586,7 +5586,7 @@
             <a:fld id="{B61BEF0D-F0BB-DE4B-95CE-6DB70DBA9567}" type="datetimeFigureOut">
               <a:rPr lang="en-US" dirty="0"/>
               <a:pPr/>
-              <a:t>5/15/2014</a:t>
+              <a:t>5/16/2014</a:t>
             </a:fld>
             <a:endParaRPr lang="en-US" dirty="0"/>
           </a:p>
@@ -5678,7 +5678,7 @@
             <a:fld id="{B61BEF0D-F0BB-DE4B-95CE-6DB70DBA9567}" type="datetimeFigureOut">
               <a:rPr lang="en-US" dirty="0"/>
               <a:pPr/>
-              <a:t>5/15/2014</a:t>
+              <a:t>5/16/2014</a:t>
             </a:fld>
             <a:endParaRPr lang="en-US" dirty="0"/>
           </a:p>
@@ -5958,7 +5958,7 @@
             <a:fld id="{B61BEF0D-F0BB-DE4B-95CE-6DB70DBA9567}" type="datetimeFigureOut">
               <a:rPr lang="en-US" dirty="0"/>
               <a:pPr/>
-              <a:t>5/15/2014</a:t>
+              <a:t>5/16/2014</a:t>
             </a:fld>
             <a:endParaRPr lang="en-US" dirty="0"/>
           </a:p>
@@ -6246,7 +6246,7 @@
             <a:fld id="{B61BEF0D-F0BB-DE4B-95CE-6DB70DBA9567}" type="datetimeFigureOut">
               <a:rPr lang="en-US" dirty="0"/>
               <a:pPr/>
-              <a:t>5/15/2014</a:t>
+              <a:t>5/16/2014</a:t>
             </a:fld>
             <a:endParaRPr lang="en-US" dirty="0"/>
           </a:p>
@@ -6773,7 +6773,7 @@
             <a:fld id="{B61BEF0D-F0BB-DE4B-95CE-6DB70DBA9567}" type="datetimeFigureOut">
               <a:rPr lang="en-US" dirty="0"/>
               <a:pPr/>
-              <a:t>5/15/2014</a:t>
+              <a:t>5/16/2014</a:t>
             </a:fld>
             <a:endParaRPr lang="en-US" dirty="0"/>
           </a:p>
@@ -7435,6 +7435,581 @@
 </file>
 
 <file path=ppt/slides/slide3.xml><?xml version="1.0" encoding="utf-8"?>
+<p:sld xmlns:a="http://schemas.openxmlformats.org/drawingml/2006/main" xmlns:r="http://schemas.openxmlformats.org/officeDocument/2006/relationships" xmlns:p="http://schemas.openxmlformats.org/presentationml/2006/main">
+  <p:cSld>
+    <p:spTree>
+      <p:nvGrpSpPr>
+        <p:cNvPr id="1" name=""/>
+        <p:cNvGrpSpPr/>
+        <p:nvPr/>
+      </p:nvGrpSpPr>
+      <p:grpSpPr>
+        <a:xfrm>
+          <a:off x="0" y="0"/>
+          <a:ext cx="0" cy="0"/>
+          <a:chOff x="0" y="0"/>
+          <a:chExt cx="0" cy="0"/>
+        </a:xfrm>
+      </p:grpSpPr>
+      <p:graphicFrame>
+        <p:nvGraphicFramePr>
+          <p:cNvPr id="5" name="Inhaltsplatzhalter 3"/>
+          <p:cNvGraphicFramePr>
+            <a:graphicFrameLocks/>
+          </p:cNvGraphicFramePr>
+          <p:nvPr>
+            <p:extLst>
+              <p:ext uri="{D42A27DB-BD31-4B8C-83A1-F6EECF244321}">
+                <p14:modId xmlns:p14="http://schemas.microsoft.com/office/powerpoint/2010/main" val="1859164494"/>
+              </p:ext>
+            </p:extLst>
+          </p:nvPr>
+        </p:nvGraphicFramePr>
+        <p:xfrm>
+          <a:off x="3583745" y="1760220"/>
+          <a:ext cx="6679142" cy="3337560"/>
+        </p:xfrm>
+        <a:graphic>
+          <a:graphicData uri="http://schemas.openxmlformats.org/drawingml/2006/table">
+            <a:tbl>
+              <a:tblPr firstRow="1" bandRow="1">
+                <a:tableStyleId>{5C22544A-7EE6-4342-B048-85BDC9FD1C3A}</a:tableStyleId>
+              </a:tblPr>
+              <a:tblGrid>
+                <a:gridCol w="3339571"/>
+                <a:gridCol w="3339571"/>
+              </a:tblGrid>
+              <a:tr h="370840">
+                <a:tc>
+                  <a:txBody>
+                    <a:bodyPr/>
+                    <a:lstStyle/>
+                    <a:p>
+                      <a:r>
+                        <a:rPr lang="de-AT" dirty="0" err="1" smtClean="0"/>
+                        <a:t>Component</a:t>
+                      </a:r>
+                      <a:endParaRPr lang="de-AT" dirty="0"/>
+                    </a:p>
+                  </a:txBody>
+                  <a:tcPr/>
+                </a:tc>
+                <a:tc>
+                  <a:txBody>
+                    <a:bodyPr/>
+                    <a:lstStyle/>
+                    <a:p>
+                      <a:r>
+                        <a:rPr lang="de-AT" dirty="0" smtClean="0"/>
+                        <a:t>Status</a:t>
+                      </a:r>
+                      <a:endParaRPr lang="de-AT" dirty="0"/>
+                    </a:p>
+                  </a:txBody>
+                  <a:tcPr/>
+                </a:tc>
+              </a:tr>
+              <a:tr h="370840">
+                <a:tc>
+                  <a:txBody>
+                    <a:bodyPr/>
+                    <a:lstStyle/>
+                    <a:p>
+                      <a:r>
+                        <a:rPr lang="de-AT" dirty="0" smtClean="0"/>
+                        <a:t>File</a:t>
+                      </a:r>
+                      <a:endParaRPr lang="de-AT" dirty="0"/>
+                    </a:p>
+                  </a:txBody>
+                  <a:tcPr/>
+                </a:tc>
+                <a:tc>
+                  <a:txBody>
+                    <a:bodyPr/>
+                    <a:lstStyle/>
+                    <a:p>
+                      <a:endParaRPr lang="de-AT" dirty="0"/>
+                    </a:p>
+                  </a:txBody>
+                  <a:tcPr/>
+                </a:tc>
+              </a:tr>
+              <a:tr h="370840">
+                <a:tc>
+                  <a:txBody>
+                    <a:bodyPr/>
+                    <a:lstStyle/>
+                    <a:p>
+                      <a:r>
+                        <a:rPr lang="de-AT" dirty="0" err="1" smtClean="0"/>
+                        <a:t>Sql</a:t>
+                      </a:r>
+                      <a:endParaRPr lang="de-AT" dirty="0"/>
+                    </a:p>
+                  </a:txBody>
+                  <a:tcPr/>
+                </a:tc>
+                <a:tc>
+                  <a:txBody>
+                    <a:bodyPr/>
+                    <a:lstStyle/>
+                    <a:p>
+                      <a:endParaRPr lang="de-AT" dirty="0"/>
+                    </a:p>
+                  </a:txBody>
+                  <a:tcPr/>
+                </a:tc>
+              </a:tr>
+              <a:tr h="370840">
+                <a:tc>
+                  <a:txBody>
+                    <a:bodyPr/>
+                    <a:lstStyle/>
+                    <a:p>
+                      <a:r>
+                        <a:rPr lang="de-AT" dirty="0" smtClean="0"/>
+                        <a:t>Facebook</a:t>
+                      </a:r>
+                      <a:endParaRPr lang="de-AT" dirty="0"/>
+                    </a:p>
+                  </a:txBody>
+                  <a:tcPr/>
+                </a:tc>
+                <a:tc>
+                  <a:txBody>
+                    <a:bodyPr/>
+                    <a:lstStyle/>
+                    <a:p>
+                      <a:endParaRPr lang="de-AT" dirty="0"/>
+                    </a:p>
+                  </a:txBody>
+                  <a:tcPr/>
+                </a:tc>
+              </a:tr>
+              <a:tr h="370840">
+                <a:tc>
+                  <a:txBody>
+                    <a:bodyPr/>
+                    <a:lstStyle/>
+                    <a:p>
+                      <a:r>
+                        <a:rPr lang="de-AT" dirty="0" smtClean="0"/>
+                        <a:t>Twitter</a:t>
+                      </a:r>
+                      <a:endParaRPr lang="de-AT" dirty="0"/>
+                    </a:p>
+                  </a:txBody>
+                  <a:tcPr/>
+                </a:tc>
+                <a:tc>
+                  <a:txBody>
+                    <a:bodyPr/>
+                    <a:lstStyle/>
+                    <a:p>
+                      <a:endParaRPr lang="de-AT" dirty="0"/>
+                    </a:p>
+                  </a:txBody>
+                  <a:tcPr/>
+                </a:tc>
+              </a:tr>
+              <a:tr h="370840">
+                <a:tc>
+                  <a:txBody>
+                    <a:bodyPr/>
+                    <a:lstStyle/>
+                    <a:p>
+                      <a:r>
+                        <a:rPr lang="de-AT" dirty="0" smtClean="0"/>
+                        <a:t>Rest</a:t>
+                      </a:r>
+                      <a:endParaRPr lang="de-AT" dirty="0"/>
+                    </a:p>
+                  </a:txBody>
+                  <a:tcPr/>
+                </a:tc>
+                <a:tc>
+                  <a:txBody>
+                    <a:bodyPr/>
+                    <a:lstStyle/>
+                    <a:p>
+                      <a:endParaRPr lang="de-AT" dirty="0"/>
+                    </a:p>
+                  </a:txBody>
+                  <a:tcPr/>
+                </a:tc>
+              </a:tr>
+              <a:tr h="370840">
+                <a:tc>
+                  <a:txBody>
+                    <a:bodyPr/>
+                    <a:lstStyle/>
+                    <a:p>
+                      <a:r>
+                        <a:rPr lang="de-AT" dirty="0" err="1" smtClean="0"/>
+                        <a:t>Smtp</a:t>
+                      </a:r>
+                      <a:endParaRPr lang="de-AT" dirty="0"/>
+                    </a:p>
+                  </a:txBody>
+                  <a:tcPr/>
+                </a:tc>
+                <a:tc>
+                  <a:txBody>
+                    <a:bodyPr/>
+                    <a:lstStyle/>
+                    <a:p>
+                      <a:endParaRPr lang="de-AT" dirty="0"/>
+                    </a:p>
+                  </a:txBody>
+                  <a:tcPr/>
+                </a:tc>
+              </a:tr>
+              <a:tr h="370840">
+                <a:tc>
+                  <a:txBody>
+                    <a:bodyPr/>
+                    <a:lstStyle/>
+                    <a:p>
+                      <a:r>
+                        <a:rPr lang="de-AT" dirty="0" smtClean="0"/>
+                        <a:t>Mock </a:t>
+                      </a:r>
+                      <a:r>
+                        <a:rPr lang="de-AT" dirty="0" err="1" smtClean="0"/>
+                        <a:t>or</a:t>
+                      </a:r>
+                      <a:r>
+                        <a:rPr lang="de-AT" dirty="0" smtClean="0"/>
+                        <a:t> Test</a:t>
+                      </a:r>
+                      <a:endParaRPr lang="de-AT" dirty="0"/>
+                    </a:p>
+                  </a:txBody>
+                  <a:tcPr/>
+                </a:tc>
+                <a:tc>
+                  <a:txBody>
+                    <a:bodyPr/>
+                    <a:lstStyle/>
+                    <a:p>
+                      <a:endParaRPr lang="de-AT" dirty="0"/>
+                    </a:p>
+                  </a:txBody>
+                  <a:tcPr/>
+                </a:tc>
+              </a:tr>
+              <a:tr h="370840">
+                <a:tc>
+                  <a:txBody>
+                    <a:bodyPr/>
+                    <a:lstStyle/>
+                    <a:p>
+                      <a:r>
+                        <a:rPr lang="de-AT" dirty="0" err="1" smtClean="0"/>
+                        <a:t>Cxf</a:t>
+                      </a:r>
+                      <a:endParaRPr lang="de-AT" dirty="0"/>
+                    </a:p>
+                  </a:txBody>
+                  <a:tcPr/>
+                </a:tc>
+                <a:tc>
+                  <a:txBody>
+                    <a:bodyPr/>
+                    <a:lstStyle/>
+                    <a:p>
+                      <a:endParaRPr lang="de-AT" dirty="0"/>
+                    </a:p>
+                  </a:txBody>
+                  <a:tcPr/>
+                </a:tc>
+              </a:tr>
+            </a:tbl>
+          </a:graphicData>
+        </a:graphic>
+      </p:graphicFrame>
+      <p:pic>
+        <p:nvPicPr>
+          <p:cNvPr id="7" name="Picture 2" descr="http://vitamin-c.vitamin-power.eu/assets/images/Gruener-Haken.jpg"/>
+          <p:cNvPicPr>
+            <a:picLocks noChangeAspect="1" noChangeArrowheads="1"/>
+          </p:cNvPicPr>
+          <p:nvPr/>
+        </p:nvPicPr>
+        <p:blipFill>
+          <a:blip r:embed="rId3">
+            <a:extLst>
+              <a:ext uri="{28A0092B-C50C-407E-A947-70E740481C1C}">
+                <a14:useLocalDpi xmlns:a14="http://schemas.microsoft.com/office/drawing/2010/main" val="0"/>
+              </a:ext>
+            </a:extLst>
+          </a:blip>
+          <a:srcRect/>
+          <a:stretch>
+            <a:fillRect/>
+          </a:stretch>
+        </p:blipFill>
+        <p:spPr bwMode="auto">
+          <a:xfrm>
+            <a:off x="8394700" y="2196607"/>
+            <a:ext cx="246554" cy="246554"/>
+          </a:xfrm>
+          <a:prstGeom prst="rect">
+            <a:avLst/>
+          </a:prstGeom>
+          <a:noFill/>
+          <a:extLst>
+            <a:ext uri="{909E8E84-426E-40DD-AFC4-6F175D3DCCD1}">
+              <a14:hiddenFill xmlns:a14="http://schemas.microsoft.com/office/drawing/2010/main">
+                <a:solidFill>
+                  <a:srgbClr val="FFFFFF"/>
+                </a:solidFill>
+              </a14:hiddenFill>
+            </a:ext>
+          </a:extLst>
+        </p:spPr>
+      </p:pic>
+      <p:pic>
+        <p:nvPicPr>
+          <p:cNvPr id="6" name="Grafik 5"/>
+          <p:cNvPicPr>
+            <a:picLocks noChangeAspect="1"/>
+          </p:cNvPicPr>
+          <p:nvPr/>
+        </p:nvPicPr>
+        <p:blipFill>
+          <a:blip r:embed="rId4"/>
+          <a:stretch>
+            <a:fillRect/>
+          </a:stretch>
+        </p:blipFill>
+        <p:spPr>
+          <a:xfrm>
+            <a:off x="8399960" y="2943254"/>
+            <a:ext cx="248400" cy="248400"/>
+          </a:xfrm>
+          <a:prstGeom prst="rect">
+            <a:avLst/>
+          </a:prstGeom>
+        </p:spPr>
+      </p:pic>
+      <p:pic>
+        <p:nvPicPr>
+          <p:cNvPr id="9" name="Grafik 8"/>
+          <p:cNvPicPr>
+            <a:picLocks noChangeAspect="1"/>
+          </p:cNvPicPr>
+          <p:nvPr/>
+        </p:nvPicPr>
+        <p:blipFill>
+          <a:blip r:embed="rId4"/>
+          <a:stretch>
+            <a:fillRect/>
+          </a:stretch>
+        </p:blipFill>
+        <p:spPr>
+          <a:xfrm>
+            <a:off x="8399960" y="3310328"/>
+            <a:ext cx="248400" cy="248400"/>
+          </a:xfrm>
+          <a:prstGeom prst="rect">
+            <a:avLst/>
+          </a:prstGeom>
+        </p:spPr>
+      </p:pic>
+      <p:pic>
+        <p:nvPicPr>
+          <p:cNvPr id="10" name="Grafik 9"/>
+          <p:cNvPicPr>
+            <a:picLocks noChangeAspect="1"/>
+          </p:cNvPicPr>
+          <p:nvPr/>
+        </p:nvPicPr>
+        <p:blipFill>
+          <a:blip r:embed="rId4"/>
+          <a:stretch>
+            <a:fillRect/>
+          </a:stretch>
+        </p:blipFill>
+        <p:spPr>
+          <a:xfrm>
+            <a:off x="8399960" y="3666892"/>
+            <a:ext cx="248400" cy="248400"/>
+          </a:xfrm>
+          <a:prstGeom prst="rect">
+            <a:avLst/>
+          </a:prstGeom>
+        </p:spPr>
+      </p:pic>
+      <p:pic>
+        <p:nvPicPr>
+          <p:cNvPr id="12" name="Picture 2" descr="http://vitamin-c.vitamin-power.eu/assets/images/Gruener-Haken.jpg"/>
+          <p:cNvPicPr>
+            <a:picLocks noChangeAspect="1" noChangeArrowheads="1"/>
+          </p:cNvPicPr>
+          <p:nvPr/>
+        </p:nvPicPr>
+        <p:blipFill>
+          <a:blip r:embed="rId3">
+            <a:extLst>
+              <a:ext uri="{28A0092B-C50C-407E-A947-70E740481C1C}">
+                <a14:useLocalDpi xmlns:a14="http://schemas.microsoft.com/office/drawing/2010/main" val="0"/>
+              </a:ext>
+            </a:extLst>
+          </a:blip>
+          <a:srcRect/>
+          <a:stretch>
+            <a:fillRect/>
+          </a:stretch>
+        </p:blipFill>
+        <p:spPr bwMode="auto">
+          <a:xfrm>
+            <a:off x="8394700" y="4411550"/>
+            <a:ext cx="246554" cy="246554"/>
+          </a:xfrm>
+          <a:prstGeom prst="rect">
+            <a:avLst/>
+          </a:prstGeom>
+          <a:noFill/>
+          <a:extLst>
+            <a:ext uri="{909E8E84-426E-40DD-AFC4-6F175D3DCCD1}">
+              <a14:hiddenFill xmlns:a14="http://schemas.microsoft.com/office/drawing/2010/main">
+                <a:solidFill>
+                  <a:srgbClr val="FFFFFF"/>
+                </a:solidFill>
+              </a14:hiddenFill>
+            </a:ext>
+          </a:extLst>
+        </p:spPr>
+      </p:pic>
+      <p:pic>
+        <p:nvPicPr>
+          <p:cNvPr id="13" name="Grafik 12"/>
+          <p:cNvPicPr>
+            <a:picLocks noChangeAspect="1"/>
+          </p:cNvPicPr>
+          <p:nvPr/>
+        </p:nvPicPr>
+        <p:blipFill>
+          <a:blip r:embed="rId4"/>
+          <a:stretch>
+            <a:fillRect/>
+          </a:stretch>
+        </p:blipFill>
+        <p:spPr>
+          <a:xfrm>
+            <a:off x="8399960" y="4782222"/>
+            <a:ext cx="248400" cy="248400"/>
+          </a:xfrm>
+          <a:prstGeom prst="rect">
+            <a:avLst/>
+          </a:prstGeom>
+        </p:spPr>
+      </p:pic>
+      <p:pic>
+        <p:nvPicPr>
+          <p:cNvPr id="11" name="Picture 2" descr="http://vitamin-c.vitamin-power.eu/assets/images/Gruener-Haken.jpg"/>
+          <p:cNvPicPr>
+            <a:picLocks noChangeAspect="1" noChangeArrowheads="1"/>
+          </p:cNvPicPr>
+          <p:nvPr/>
+        </p:nvPicPr>
+        <p:blipFill>
+          <a:blip r:embed="rId3">
+            <a:extLst>
+              <a:ext uri="{28A0092B-C50C-407E-A947-70E740481C1C}">
+                <a14:useLocalDpi xmlns:a14="http://schemas.microsoft.com/office/drawing/2010/main" val="0"/>
+              </a:ext>
+            </a:extLst>
+          </a:blip>
+          <a:srcRect/>
+          <a:stretch>
+            <a:fillRect/>
+          </a:stretch>
+        </p:blipFill>
+        <p:spPr bwMode="auto">
+          <a:xfrm>
+            <a:off x="8401806" y="4040878"/>
+            <a:ext cx="246554" cy="246554"/>
+          </a:xfrm>
+          <a:prstGeom prst="rect">
+            <a:avLst/>
+          </a:prstGeom>
+          <a:noFill/>
+          <a:extLst>
+            <a:ext uri="{909E8E84-426E-40DD-AFC4-6F175D3DCCD1}">
+              <a14:hiddenFill xmlns:a14="http://schemas.microsoft.com/office/drawing/2010/main">
+                <a:solidFill>
+                  <a:srgbClr val="FFFFFF"/>
+                </a:solidFill>
+              </a14:hiddenFill>
+            </a:ext>
+          </a:extLst>
+        </p:spPr>
+      </p:pic>
+      <p:pic>
+        <p:nvPicPr>
+          <p:cNvPr id="14" name="Picture 2" descr="http://vitamin-c.vitamin-power.eu/assets/images/Gruener-Haken.jpg"/>
+          <p:cNvPicPr>
+            <a:picLocks noChangeAspect="1" noChangeArrowheads="1"/>
+          </p:cNvPicPr>
+          <p:nvPr/>
+        </p:nvPicPr>
+        <p:blipFill>
+          <a:blip r:embed="rId3">
+            <a:extLst>
+              <a:ext uri="{28A0092B-C50C-407E-A947-70E740481C1C}">
+                <a14:useLocalDpi xmlns:a14="http://schemas.microsoft.com/office/drawing/2010/main" val="0"/>
+              </a:ext>
+            </a:extLst>
+          </a:blip>
+          <a:srcRect/>
+          <a:stretch>
+            <a:fillRect/>
+          </a:stretch>
+        </p:blipFill>
+        <p:spPr bwMode="auto">
+          <a:xfrm>
+            <a:off x="8393046" y="2567516"/>
+            <a:ext cx="246554" cy="246554"/>
+          </a:xfrm>
+          <a:prstGeom prst="rect">
+            <a:avLst/>
+          </a:prstGeom>
+          <a:noFill/>
+          <a:extLst>
+            <a:ext uri="{909E8E84-426E-40DD-AFC4-6F175D3DCCD1}">
+              <a14:hiddenFill xmlns:a14="http://schemas.microsoft.com/office/drawing/2010/main">
+                <a:solidFill>
+                  <a:srgbClr val="FFFFFF"/>
+                </a:solidFill>
+              </a14:hiddenFill>
+            </a:ext>
+          </a:extLst>
+        </p:spPr>
+      </p:pic>
+    </p:spTree>
+    <p:extLst>
+      <p:ext uri="{BB962C8B-B14F-4D97-AF65-F5344CB8AC3E}">
+        <p14:creationId xmlns:p14="http://schemas.microsoft.com/office/powerpoint/2010/main" val="2585225461"/>
+      </p:ext>
+    </p:extLst>
+  </p:cSld>
+  <p:clrMapOvr>
+    <a:masterClrMapping/>
+  </p:clrMapOvr>
+  <p:timing>
+    <p:tnLst>
+      <p:par>
+        <p:cTn id="1" dur="indefinite" restart="never" nodeType="tmRoot"/>
+      </p:par>
+    </p:tnLst>
+  </p:timing>
+</p:sld>
+</file>
+
+<file path=ppt/slides/slide4.xml><?xml version="1.0" encoding="utf-8"?>
 <p:sld xmlns:a="http://schemas.openxmlformats.org/drawingml/2006/main" xmlns:r="http://schemas.openxmlformats.org/officeDocument/2006/relationships" xmlns:p="http://schemas.openxmlformats.org/presentationml/2006/main">
   <p:cSld>
     <p:spTree>
@@ -8233,564 +8808,6 @@
 </p:sld>
 </file>
 
-<file path=ppt/slides/slide4.xml><?xml version="1.0" encoding="utf-8"?>
-<p:sld xmlns:a="http://schemas.openxmlformats.org/drawingml/2006/main" xmlns:r="http://schemas.openxmlformats.org/officeDocument/2006/relationships" xmlns:p="http://schemas.openxmlformats.org/presentationml/2006/main">
-  <p:cSld>
-    <p:spTree>
-      <p:nvGrpSpPr>
-        <p:cNvPr id="1" name=""/>
-        <p:cNvGrpSpPr/>
-        <p:nvPr/>
-      </p:nvGrpSpPr>
-      <p:grpSpPr>
-        <a:xfrm>
-          <a:off x="0" y="0"/>
-          <a:ext cx="0" cy="0"/>
-          <a:chOff x="0" y="0"/>
-          <a:chExt cx="0" cy="0"/>
-        </a:xfrm>
-      </p:grpSpPr>
-      <p:graphicFrame>
-        <p:nvGraphicFramePr>
-          <p:cNvPr id="5" name="Inhaltsplatzhalter 3"/>
-          <p:cNvGraphicFramePr>
-            <a:graphicFrameLocks/>
-          </p:cNvGraphicFramePr>
-          <p:nvPr>
-            <p:extLst>
-              <p:ext uri="{D42A27DB-BD31-4B8C-83A1-F6EECF244321}">
-                <p14:modId xmlns:p14="http://schemas.microsoft.com/office/powerpoint/2010/main" val="1859164494"/>
-              </p:ext>
-            </p:extLst>
-          </p:nvPr>
-        </p:nvGraphicFramePr>
-        <p:xfrm>
-          <a:off x="3583745" y="1760220"/>
-          <a:ext cx="6679142" cy="3337560"/>
-        </p:xfrm>
-        <a:graphic>
-          <a:graphicData uri="http://schemas.openxmlformats.org/drawingml/2006/table">
-            <a:tbl>
-              <a:tblPr firstRow="1" bandRow="1">
-                <a:tableStyleId>{5C22544A-7EE6-4342-B048-85BDC9FD1C3A}</a:tableStyleId>
-              </a:tblPr>
-              <a:tblGrid>
-                <a:gridCol w="3339571"/>
-                <a:gridCol w="3339571"/>
-              </a:tblGrid>
-              <a:tr h="370840">
-                <a:tc>
-                  <a:txBody>
-                    <a:bodyPr/>
-                    <a:lstStyle/>
-                    <a:p>
-                      <a:r>
-                        <a:rPr lang="de-AT" dirty="0" err="1" smtClean="0"/>
-                        <a:t>Component</a:t>
-                      </a:r>
-                      <a:endParaRPr lang="de-AT" dirty="0"/>
-                    </a:p>
-                  </a:txBody>
-                  <a:tcPr/>
-                </a:tc>
-                <a:tc>
-                  <a:txBody>
-                    <a:bodyPr/>
-                    <a:lstStyle/>
-                    <a:p>
-                      <a:r>
-                        <a:rPr lang="de-AT" dirty="0" smtClean="0"/>
-                        <a:t>Status</a:t>
-                      </a:r>
-                      <a:endParaRPr lang="de-AT" dirty="0"/>
-                    </a:p>
-                  </a:txBody>
-                  <a:tcPr/>
-                </a:tc>
-              </a:tr>
-              <a:tr h="370840">
-                <a:tc>
-                  <a:txBody>
-                    <a:bodyPr/>
-                    <a:lstStyle/>
-                    <a:p>
-                      <a:r>
-                        <a:rPr lang="de-AT" dirty="0" smtClean="0"/>
-                        <a:t>File</a:t>
-                      </a:r>
-                      <a:endParaRPr lang="de-AT" dirty="0"/>
-                    </a:p>
-                  </a:txBody>
-                  <a:tcPr/>
-                </a:tc>
-                <a:tc>
-                  <a:txBody>
-                    <a:bodyPr/>
-                    <a:lstStyle/>
-                    <a:p>
-                      <a:endParaRPr lang="de-AT" dirty="0"/>
-                    </a:p>
-                  </a:txBody>
-                  <a:tcPr/>
-                </a:tc>
-              </a:tr>
-              <a:tr h="370840">
-                <a:tc>
-                  <a:txBody>
-                    <a:bodyPr/>
-                    <a:lstStyle/>
-                    <a:p>
-                      <a:r>
-                        <a:rPr lang="de-AT" dirty="0" err="1" smtClean="0"/>
-                        <a:t>Sql</a:t>
-                      </a:r>
-                      <a:endParaRPr lang="de-AT" dirty="0"/>
-                    </a:p>
-                  </a:txBody>
-                  <a:tcPr/>
-                </a:tc>
-                <a:tc>
-                  <a:txBody>
-                    <a:bodyPr/>
-                    <a:lstStyle/>
-                    <a:p>
-                      <a:endParaRPr lang="de-AT" dirty="0"/>
-                    </a:p>
-                  </a:txBody>
-                  <a:tcPr/>
-                </a:tc>
-              </a:tr>
-              <a:tr h="370840">
-                <a:tc>
-                  <a:txBody>
-                    <a:bodyPr/>
-                    <a:lstStyle/>
-                    <a:p>
-                      <a:r>
-                        <a:rPr lang="de-AT" dirty="0" smtClean="0"/>
-                        <a:t>Facebook</a:t>
-                      </a:r>
-                      <a:endParaRPr lang="de-AT" dirty="0"/>
-                    </a:p>
-                  </a:txBody>
-                  <a:tcPr/>
-                </a:tc>
-                <a:tc>
-                  <a:txBody>
-                    <a:bodyPr/>
-                    <a:lstStyle/>
-                    <a:p>
-                      <a:endParaRPr lang="de-AT" dirty="0"/>
-                    </a:p>
-                  </a:txBody>
-                  <a:tcPr/>
-                </a:tc>
-              </a:tr>
-              <a:tr h="370840">
-                <a:tc>
-                  <a:txBody>
-                    <a:bodyPr/>
-                    <a:lstStyle/>
-                    <a:p>
-                      <a:r>
-                        <a:rPr lang="de-AT" dirty="0" smtClean="0"/>
-                        <a:t>Twitter</a:t>
-                      </a:r>
-                      <a:endParaRPr lang="de-AT" dirty="0"/>
-                    </a:p>
-                  </a:txBody>
-                  <a:tcPr/>
-                </a:tc>
-                <a:tc>
-                  <a:txBody>
-                    <a:bodyPr/>
-                    <a:lstStyle/>
-                    <a:p>
-                      <a:endParaRPr lang="de-AT" dirty="0"/>
-                    </a:p>
-                  </a:txBody>
-                  <a:tcPr/>
-                </a:tc>
-              </a:tr>
-              <a:tr h="370840">
-                <a:tc>
-                  <a:txBody>
-                    <a:bodyPr/>
-                    <a:lstStyle/>
-                    <a:p>
-                      <a:r>
-                        <a:rPr lang="de-AT" dirty="0" smtClean="0"/>
-                        <a:t>Rest</a:t>
-                      </a:r>
-                      <a:endParaRPr lang="de-AT" dirty="0"/>
-                    </a:p>
-                  </a:txBody>
-                  <a:tcPr/>
-                </a:tc>
-                <a:tc>
-                  <a:txBody>
-                    <a:bodyPr/>
-                    <a:lstStyle/>
-                    <a:p>
-                      <a:endParaRPr lang="de-AT" dirty="0"/>
-                    </a:p>
-                  </a:txBody>
-                  <a:tcPr/>
-                </a:tc>
-              </a:tr>
-              <a:tr h="370840">
-                <a:tc>
-                  <a:txBody>
-                    <a:bodyPr/>
-                    <a:lstStyle/>
-                    <a:p>
-                      <a:r>
-                        <a:rPr lang="de-AT" dirty="0" err="1" smtClean="0"/>
-                        <a:t>Smtp</a:t>
-                      </a:r>
-                      <a:endParaRPr lang="de-AT" dirty="0"/>
-                    </a:p>
-                  </a:txBody>
-                  <a:tcPr/>
-                </a:tc>
-                <a:tc>
-                  <a:txBody>
-                    <a:bodyPr/>
-                    <a:lstStyle/>
-                    <a:p>
-                      <a:endParaRPr lang="de-AT" dirty="0"/>
-                    </a:p>
-                  </a:txBody>
-                  <a:tcPr/>
-                </a:tc>
-              </a:tr>
-              <a:tr h="370840">
-                <a:tc>
-                  <a:txBody>
-                    <a:bodyPr/>
-                    <a:lstStyle/>
-                    <a:p>
-                      <a:r>
-                        <a:rPr lang="de-AT" dirty="0" smtClean="0"/>
-                        <a:t>Mock </a:t>
-                      </a:r>
-                      <a:r>
-                        <a:rPr lang="de-AT" dirty="0" err="1" smtClean="0"/>
-                        <a:t>or</a:t>
-                      </a:r>
-                      <a:r>
-                        <a:rPr lang="de-AT" dirty="0" smtClean="0"/>
-                        <a:t> Test</a:t>
-                      </a:r>
-                      <a:endParaRPr lang="de-AT" dirty="0"/>
-                    </a:p>
-                  </a:txBody>
-                  <a:tcPr/>
-                </a:tc>
-                <a:tc>
-                  <a:txBody>
-                    <a:bodyPr/>
-                    <a:lstStyle/>
-                    <a:p>
-                      <a:endParaRPr lang="de-AT" dirty="0"/>
-                    </a:p>
-                  </a:txBody>
-                  <a:tcPr/>
-                </a:tc>
-              </a:tr>
-              <a:tr h="370840">
-                <a:tc>
-                  <a:txBody>
-                    <a:bodyPr/>
-                    <a:lstStyle/>
-                    <a:p>
-                      <a:r>
-                        <a:rPr lang="de-AT" dirty="0" err="1" smtClean="0"/>
-                        <a:t>Cxf</a:t>
-                      </a:r>
-                      <a:endParaRPr lang="de-AT" dirty="0"/>
-                    </a:p>
-                  </a:txBody>
-                  <a:tcPr/>
-                </a:tc>
-                <a:tc>
-                  <a:txBody>
-                    <a:bodyPr/>
-                    <a:lstStyle/>
-                    <a:p>
-                      <a:endParaRPr lang="de-AT" dirty="0"/>
-                    </a:p>
-                  </a:txBody>
-                  <a:tcPr/>
-                </a:tc>
-              </a:tr>
-            </a:tbl>
-          </a:graphicData>
-        </a:graphic>
-      </p:graphicFrame>
-      <p:pic>
-        <p:nvPicPr>
-          <p:cNvPr id="7" name="Picture 2" descr="http://vitamin-c.vitamin-power.eu/assets/images/Gruener-Haken.jpg"/>
-          <p:cNvPicPr>
-            <a:picLocks noChangeAspect="1" noChangeArrowheads="1"/>
-          </p:cNvPicPr>
-          <p:nvPr/>
-        </p:nvPicPr>
-        <p:blipFill>
-          <a:blip r:embed="rId3">
-            <a:extLst>
-              <a:ext uri="{28A0092B-C50C-407E-A947-70E740481C1C}">
-                <a14:useLocalDpi xmlns:a14="http://schemas.microsoft.com/office/drawing/2010/main" val="0"/>
-              </a:ext>
-            </a:extLst>
-          </a:blip>
-          <a:srcRect/>
-          <a:stretch>
-            <a:fillRect/>
-          </a:stretch>
-        </p:blipFill>
-        <p:spPr bwMode="auto">
-          <a:xfrm>
-            <a:off x="8394700" y="2196607"/>
-            <a:ext cx="246554" cy="246554"/>
-          </a:xfrm>
-          <a:prstGeom prst="rect">
-            <a:avLst/>
-          </a:prstGeom>
-          <a:noFill/>
-          <a:extLst>
-            <a:ext uri="{909E8E84-426E-40DD-AFC4-6F175D3DCCD1}">
-              <a14:hiddenFill xmlns:a14="http://schemas.microsoft.com/office/drawing/2010/main">
-                <a:solidFill>
-                  <a:srgbClr val="FFFFFF"/>
-                </a:solidFill>
-              </a14:hiddenFill>
-            </a:ext>
-          </a:extLst>
-        </p:spPr>
-      </p:pic>
-      <p:pic>
-        <p:nvPicPr>
-          <p:cNvPr id="8" name="Grafik 7"/>
-          <p:cNvPicPr>
-            <a:picLocks noChangeAspect="1"/>
-          </p:cNvPicPr>
-          <p:nvPr/>
-        </p:nvPicPr>
-        <p:blipFill>
-          <a:blip r:embed="rId4"/>
-          <a:stretch>
-            <a:fillRect/>
-          </a:stretch>
-        </p:blipFill>
-        <p:spPr>
-          <a:xfrm>
-            <a:off x="8394700" y="2576180"/>
-            <a:ext cx="248400" cy="248400"/>
-          </a:xfrm>
-          <a:prstGeom prst="rect">
-            <a:avLst/>
-          </a:prstGeom>
-        </p:spPr>
-      </p:pic>
-      <p:pic>
-        <p:nvPicPr>
-          <p:cNvPr id="6" name="Grafik 5"/>
-          <p:cNvPicPr>
-            <a:picLocks noChangeAspect="1"/>
-          </p:cNvPicPr>
-          <p:nvPr/>
-        </p:nvPicPr>
-        <p:blipFill>
-          <a:blip r:embed="rId4"/>
-          <a:stretch>
-            <a:fillRect/>
-          </a:stretch>
-        </p:blipFill>
-        <p:spPr>
-          <a:xfrm>
-            <a:off x="8399960" y="2943254"/>
-            <a:ext cx="248400" cy="248400"/>
-          </a:xfrm>
-          <a:prstGeom prst="rect">
-            <a:avLst/>
-          </a:prstGeom>
-        </p:spPr>
-      </p:pic>
-      <p:pic>
-        <p:nvPicPr>
-          <p:cNvPr id="9" name="Grafik 8"/>
-          <p:cNvPicPr>
-            <a:picLocks noChangeAspect="1"/>
-          </p:cNvPicPr>
-          <p:nvPr/>
-        </p:nvPicPr>
-        <p:blipFill>
-          <a:blip r:embed="rId4"/>
-          <a:stretch>
-            <a:fillRect/>
-          </a:stretch>
-        </p:blipFill>
-        <p:spPr>
-          <a:xfrm>
-            <a:off x="8399960" y="3310328"/>
-            <a:ext cx="248400" cy="248400"/>
-          </a:xfrm>
-          <a:prstGeom prst="rect">
-            <a:avLst/>
-          </a:prstGeom>
-        </p:spPr>
-      </p:pic>
-      <p:pic>
-        <p:nvPicPr>
-          <p:cNvPr id="10" name="Grafik 9"/>
-          <p:cNvPicPr>
-            <a:picLocks noChangeAspect="1"/>
-          </p:cNvPicPr>
-          <p:nvPr/>
-        </p:nvPicPr>
-        <p:blipFill>
-          <a:blip r:embed="rId4"/>
-          <a:stretch>
-            <a:fillRect/>
-          </a:stretch>
-        </p:blipFill>
-        <p:spPr>
-          <a:xfrm>
-            <a:off x="8399960" y="3666892"/>
-            <a:ext cx="248400" cy="248400"/>
-          </a:xfrm>
-          <a:prstGeom prst="rect">
-            <a:avLst/>
-          </a:prstGeom>
-        </p:spPr>
-      </p:pic>
-      <p:pic>
-        <p:nvPicPr>
-          <p:cNvPr id="12" name="Picture 2" descr="http://vitamin-c.vitamin-power.eu/assets/images/Gruener-Haken.jpg"/>
-          <p:cNvPicPr>
-            <a:picLocks noChangeAspect="1" noChangeArrowheads="1"/>
-          </p:cNvPicPr>
-          <p:nvPr/>
-        </p:nvPicPr>
-        <p:blipFill>
-          <a:blip r:embed="rId3">
-            <a:extLst>
-              <a:ext uri="{28A0092B-C50C-407E-A947-70E740481C1C}">
-                <a14:useLocalDpi xmlns:a14="http://schemas.microsoft.com/office/drawing/2010/main" val="0"/>
-              </a:ext>
-            </a:extLst>
-          </a:blip>
-          <a:srcRect/>
-          <a:stretch>
-            <a:fillRect/>
-          </a:stretch>
-        </p:blipFill>
-        <p:spPr bwMode="auto">
-          <a:xfrm>
-            <a:off x="8394700" y="4411550"/>
-            <a:ext cx="246554" cy="246554"/>
-          </a:xfrm>
-          <a:prstGeom prst="rect">
-            <a:avLst/>
-          </a:prstGeom>
-          <a:noFill/>
-          <a:extLst>
-            <a:ext uri="{909E8E84-426E-40DD-AFC4-6F175D3DCCD1}">
-              <a14:hiddenFill xmlns:a14="http://schemas.microsoft.com/office/drawing/2010/main">
-                <a:solidFill>
-                  <a:srgbClr val="FFFFFF"/>
-                </a:solidFill>
-              </a14:hiddenFill>
-            </a:ext>
-          </a:extLst>
-        </p:spPr>
-      </p:pic>
-      <p:pic>
-        <p:nvPicPr>
-          <p:cNvPr id="13" name="Grafik 12"/>
-          <p:cNvPicPr>
-            <a:picLocks noChangeAspect="1"/>
-          </p:cNvPicPr>
-          <p:nvPr/>
-        </p:nvPicPr>
-        <p:blipFill>
-          <a:blip r:embed="rId4"/>
-          <a:stretch>
-            <a:fillRect/>
-          </a:stretch>
-        </p:blipFill>
-        <p:spPr>
-          <a:xfrm>
-            <a:off x="8399960" y="4782222"/>
-            <a:ext cx="248400" cy="248400"/>
-          </a:xfrm>
-          <a:prstGeom prst="rect">
-            <a:avLst/>
-          </a:prstGeom>
-        </p:spPr>
-      </p:pic>
-      <p:pic>
-        <p:nvPicPr>
-          <p:cNvPr id="11" name="Picture 2" descr="http://vitamin-c.vitamin-power.eu/assets/images/Gruener-Haken.jpg"/>
-          <p:cNvPicPr>
-            <a:picLocks noChangeAspect="1" noChangeArrowheads="1"/>
-          </p:cNvPicPr>
-          <p:nvPr/>
-        </p:nvPicPr>
-        <p:blipFill>
-          <a:blip r:embed="rId3">
-            <a:extLst>
-              <a:ext uri="{28A0092B-C50C-407E-A947-70E740481C1C}">
-                <a14:useLocalDpi xmlns:a14="http://schemas.microsoft.com/office/drawing/2010/main" val="0"/>
-              </a:ext>
-            </a:extLst>
-          </a:blip>
-          <a:srcRect/>
-          <a:stretch>
-            <a:fillRect/>
-          </a:stretch>
-        </p:blipFill>
-        <p:spPr bwMode="auto">
-          <a:xfrm>
-            <a:off x="8401806" y="4040878"/>
-            <a:ext cx="246554" cy="246554"/>
-          </a:xfrm>
-          <a:prstGeom prst="rect">
-            <a:avLst/>
-          </a:prstGeom>
-          <a:noFill/>
-          <a:extLst>
-            <a:ext uri="{909E8E84-426E-40DD-AFC4-6F175D3DCCD1}">
-              <a14:hiddenFill xmlns:a14="http://schemas.microsoft.com/office/drawing/2010/main">
-                <a:solidFill>
-                  <a:srgbClr val="FFFFFF"/>
-                </a:solidFill>
-              </a14:hiddenFill>
-            </a:ext>
-          </a:extLst>
-        </p:spPr>
-      </p:pic>
-    </p:spTree>
-    <p:extLst>
-      <p:ext uri="{BB962C8B-B14F-4D97-AF65-F5344CB8AC3E}">
-        <p14:creationId xmlns:p14="http://schemas.microsoft.com/office/powerpoint/2010/main" val="2585225461"/>
-      </p:ext>
-    </p:extLst>
-  </p:cSld>
-  <p:clrMapOvr>
-    <a:masterClrMapping/>
-  </p:clrMapOvr>
-  <p:timing>
-    <p:tnLst>
-      <p:par>
-        <p:cTn id="1" dur="indefinite" restart="never" nodeType="tmRoot"/>
-      </p:par>
-    </p:tnLst>
-  </p:timing>
-</p:sld>
-</file>
-
 <file path=ppt/slides/slide5.xml><?xml version="1.0" encoding="utf-8"?>
 <p:sld xmlns:a="http://schemas.openxmlformats.org/drawingml/2006/main" xmlns:r="http://schemas.openxmlformats.org/officeDocument/2006/relationships" xmlns:p="http://schemas.openxmlformats.org/presentationml/2006/main">
   <p:cSld>
@@ -8852,7 +8869,7 @@
       </p:sp>
       <p:pic>
         <p:nvPicPr>
-          <p:cNvPr id="5" name="Grafik 4"/>
+          <p:cNvPr id="4" name="Grafik 3"/>
           <p:cNvPicPr>
             <a:picLocks noChangeAspect="1"/>
           </p:cNvPicPr>
@@ -8860,13 +8877,13 @@
         </p:nvPicPr>
         <p:blipFill rotWithShape="1">
           <a:blip r:embed="rId3"/>
-          <a:srcRect t="24259" r="76146" b="54445"/>
+          <a:srcRect t="24370" r="76000" b="54741"/>
           <a:stretch/>
         </p:blipFill>
         <p:spPr>
           <a:xfrm>
-            <a:off x="4312441" y="3133724"/>
-            <a:ext cx="4362450" cy="2190750"/>
+            <a:off x="4299106" y="3154679"/>
+            <a:ext cx="4389120" cy="2148840"/>
           </a:xfrm>
           <a:prstGeom prst="rect">
             <a:avLst/>

</xml_diff>